<commit_message>
corrected numbering in algorithms of ppt
</commit_message>
<xml_diff>
--- a/Presentation/An improved Id3 algorithm for clinical data classification.pptx
+++ b/Presentation/An improved Id3 algorithm for clinical data classification.pptx
@@ -5,10 +5,10 @@
     <p:sldMasterId id="2147483998" r:id="rId1"/>
   </p:sldMasterIdLst>
   <p:notesMasterIdLst>
-    <p:notesMasterId r:id="rId20"/>
+    <p:notesMasterId r:id="rId19"/>
   </p:notesMasterIdLst>
   <p:handoutMasterIdLst>
-    <p:handoutMasterId r:id="rId21"/>
+    <p:handoutMasterId r:id="rId20"/>
   </p:handoutMasterIdLst>
   <p:sldIdLst>
     <p:sldId id="256" r:id="rId2"/>
@@ -25,10 +25,9 @@
     <p:sldId id="274" r:id="rId13"/>
     <p:sldId id="279" r:id="rId14"/>
     <p:sldId id="275" r:id="rId15"/>
-    <p:sldId id="276" r:id="rId16"/>
-    <p:sldId id="278" r:id="rId17"/>
-    <p:sldId id="270" r:id="rId18"/>
-    <p:sldId id="273" r:id="rId19"/>
+    <p:sldId id="278" r:id="rId16"/>
+    <p:sldId id="270" r:id="rId17"/>
+    <p:sldId id="273" r:id="rId18"/>
   </p:sldIdLst>
   <p:sldSz cx="12192000" cy="6858000"/>
   <p:notesSz cx="6858000" cy="9144000"/>
@@ -221,7 +220,7 @@
           <a:p>
             <a:fld id="{8B487AC0-751F-4CC1-BAAD-8544169A951F}" type="datetimeFigureOut">
               <a:rPr lang="en-US" smtClean="0"/>
-              <a:t>14-Aug-18</a:t>
+              <a:t>8/15/2018</a:t>
             </a:fld>
             <a:endParaRPr lang="en-US"/>
           </a:p>
@@ -391,7 +390,7 @@
           <a:p>
             <a:fld id="{A536A149-6B52-45C3-8644-19770B984064}" type="datetimeFigureOut">
               <a:rPr lang="en-US" smtClean="0"/>
-              <a:t>14-Aug-18</a:t>
+              <a:t>8/15/2018</a:t>
             </a:fld>
             <a:endParaRPr lang="en-US"/>
           </a:p>
@@ -1489,7 +1488,7 @@
           <a:p>
             <a:fld id="{CF29A8A6-5AF5-429F-8424-D657E8C8C305}" type="datetime1">
               <a:rPr lang="en-US" smtClean="0"/>
-              <a:t>14-Aug-18</a:t>
+              <a:t>8/15/2018</a:t>
             </a:fld>
             <a:endParaRPr lang="en-US"/>
           </a:p>
@@ -1744,7 +1743,7 @@
           <a:p>
             <a:fld id="{6D3FA672-2729-4B1D-B801-33C0C7B90182}" type="datetime1">
               <a:rPr lang="en-US" smtClean="0"/>
-              <a:t>14-Aug-18</a:t>
+              <a:t>8/15/2018</a:t>
             </a:fld>
             <a:endParaRPr lang="en-US"/>
           </a:p>
@@ -2063,7 +2062,7 @@
           <a:p>
             <a:fld id="{6D3FA672-2729-4B1D-B801-33C0C7B90182}" type="datetime1">
               <a:rPr lang="en-US" smtClean="0"/>
-              <a:t>14-Aug-18</a:t>
+              <a:t>8/15/2018</a:t>
             </a:fld>
             <a:endParaRPr lang="en-US"/>
           </a:p>
@@ -2409,7 +2408,7 @@
           <a:p>
             <a:fld id="{6D3FA672-2729-4B1D-B801-33C0C7B90182}" type="datetime1">
               <a:rPr lang="en-US" smtClean="0"/>
-              <a:t>14-Aug-18</a:t>
+              <a:t>8/15/2018</a:t>
             </a:fld>
             <a:endParaRPr lang="en-US"/>
           </a:p>
@@ -2728,7 +2727,7 @@
           <a:p>
             <a:fld id="{6D3FA672-2729-4B1D-B801-33C0C7B90182}" type="datetime1">
               <a:rPr lang="en-US" smtClean="0"/>
-              <a:t>14-Aug-18</a:t>
+              <a:t>8/15/2018</a:t>
             </a:fld>
             <a:endParaRPr lang="en-US"/>
           </a:p>
@@ -3126,7 +3125,7 @@
           <a:p>
             <a:fld id="{6D3FA672-2729-4B1D-B801-33C0C7B90182}" type="datetime1">
               <a:rPr lang="en-US" smtClean="0"/>
-              <a:t>14-Aug-18</a:t>
+              <a:t>8/15/2018</a:t>
             </a:fld>
             <a:endParaRPr lang="en-US"/>
           </a:p>
@@ -3301,7 +3300,7 @@
           <a:p>
             <a:fld id="{D94B73AE-0F46-41DB-9B02-E870DDE8E470}" type="datetime1">
               <a:rPr lang="en-US" smtClean="0"/>
-              <a:t>14-Aug-18</a:t>
+              <a:t>8/15/2018</a:t>
             </a:fld>
             <a:endParaRPr lang="en-US"/>
           </a:p>
@@ -3485,7 +3484,7 @@
           <a:p>
             <a:fld id="{1BFB0A98-C673-4A16-A56E-AABBCD58B284}" type="datetime1">
               <a:rPr lang="en-US" smtClean="0"/>
-              <a:t>14-Aug-18</a:t>
+              <a:t>8/15/2018</a:t>
             </a:fld>
             <a:endParaRPr lang="en-US"/>
           </a:p>
@@ -3665,7 +3664,7 @@
           <a:p>
             <a:fld id="{394D53E8-1B8B-4755-93F2-632F5DEDB722}" type="datetime1">
               <a:rPr lang="en-US" smtClean="0"/>
-              <a:t>14-Aug-18</a:t>
+              <a:t>8/15/2018</a:t>
             </a:fld>
             <a:endParaRPr lang="en-US"/>
           </a:p>
@@ -3916,7 +3915,7 @@
           <a:p>
             <a:fld id="{4F76FA6F-BB22-4034-8896-BDA725FDEA14}" type="datetime1">
               <a:rPr lang="en-US" smtClean="0"/>
-              <a:t>14-Aug-18</a:t>
+              <a:t>8/15/2018</a:t>
             </a:fld>
             <a:endParaRPr lang="en-US"/>
           </a:p>
@@ -4152,7 +4151,7 @@
           <a:p>
             <a:fld id="{B838DECF-B3DC-41BA-81B7-8AAD17A6D43A}" type="datetime1">
               <a:rPr lang="en-US" smtClean="0"/>
-              <a:t>14-Aug-18</a:t>
+              <a:t>8/15/2018</a:t>
             </a:fld>
             <a:endParaRPr lang="en-US"/>
           </a:p>
@@ -4530,7 +4529,7 @@
           <a:p>
             <a:fld id="{EF3F399D-2287-40D2-8930-364E1AAA6C73}" type="datetime1">
               <a:rPr lang="en-US" smtClean="0"/>
-              <a:t>14-Aug-18</a:t>
+              <a:t>8/15/2018</a:t>
             </a:fld>
             <a:endParaRPr lang="en-US"/>
           </a:p>
@@ -4657,7 +4656,7 @@
           <a:p>
             <a:fld id="{8A86192D-61A3-47E4-95B9-7DD15D6ECB71}" type="datetime1">
               <a:rPr lang="en-US" smtClean="0"/>
-              <a:t>14-Aug-18</a:t>
+              <a:t>8/15/2018</a:t>
             </a:fld>
             <a:endParaRPr lang="en-US"/>
           </a:p>
@@ -4756,7 +4755,7 @@
           <a:p>
             <a:fld id="{17CC3252-7888-45DA-8DC5-27304C7EB0D3}" type="datetime1">
               <a:rPr lang="en-US" smtClean="0"/>
-              <a:t>14-Aug-18</a:t>
+              <a:t>8/15/2018</a:t>
             </a:fld>
             <a:endParaRPr lang="en-US"/>
           </a:p>
@@ -5015,7 +5014,7 @@
           <a:p>
             <a:fld id="{E4EE4209-0B37-473F-937B-25413C163932}" type="datetime1">
               <a:rPr lang="en-US" smtClean="0"/>
-              <a:t>14-Aug-18</a:t>
+              <a:t>8/15/2018</a:t>
             </a:fld>
             <a:endParaRPr lang="en-US"/>
           </a:p>
@@ -5282,7 +5281,7 @@
           <a:p>
             <a:fld id="{FE0E7417-5D6D-4F1E-9AAF-E473C62DE959}" type="datetime1">
               <a:rPr lang="en-US" smtClean="0"/>
-              <a:t>14-Aug-18</a:t>
+              <a:t>8/15/2018</a:t>
             </a:fld>
             <a:endParaRPr lang="en-US"/>
           </a:p>
@@ -6029,7 +6028,7 @@
           <a:p>
             <a:fld id="{6D3FA672-2729-4B1D-B801-33C0C7B90182}" type="datetime1">
               <a:rPr lang="en-US" smtClean="0"/>
-              <a:t>14-Aug-18</a:t>
+              <a:t>8/15/2018</a:t>
             </a:fld>
             <a:endParaRPr lang="en-US"/>
           </a:p>
@@ -6580,6 +6579,7 @@
           </a:bodyPr>
           <a:lstStyle/>
           <a:p>
+            <a:pPr algn="l"/>
             <a:r>
               <a:rPr lang="en-US" sz="4400" dirty="0" smtClean="0"/>
               <a:t>An improved Id3 algorithm for clinical data classification</a:t>
@@ -6605,7 +6605,7 @@
           <a:p>
             <a:fld id="{1637C8DD-A693-4F8E-9EEE-E85DF80B83C0}" type="datetime1">
               <a:rPr lang="en-US" smtClean="0"/>
-              <a:t>14-Aug-18</a:t>
+              <a:t>8/15/2018</a:t>
             </a:fld>
             <a:endParaRPr lang="en-US"/>
           </a:p>
@@ -7697,7 +7697,7 @@
           <a:p>
             <a:fld id="{394D53E8-1B8B-4755-93F2-632F5DEDB722}" type="datetime1">
               <a:rPr lang="en-US" smtClean="0"/>
-              <a:t>14-Aug-18</a:t>
+              <a:t>8/15/2018</a:t>
             </a:fld>
             <a:endParaRPr lang="en-US"/>
           </a:p>
@@ -7826,7 +7826,7 @@
           <a:p>
             <a:fld id="{394D53E8-1B8B-4755-93F2-632F5DEDB722}" type="datetime1">
               <a:rPr lang="en-US" smtClean="0"/>
-              <a:t>14-Aug-18</a:t>
+              <a:t>8/15/2018</a:t>
             </a:fld>
             <a:endParaRPr lang="en-US"/>
           </a:p>
@@ -8314,6 +8314,426 @@
       </p:grpSpPr>
       <p:sp>
         <p:nvSpPr>
+          <p:cNvPr id="8" name="Title 7"/>
+          <p:cNvSpPr>
+            <a:spLocks noGrp="1"/>
+          </p:cNvSpPr>
+          <p:nvPr>
+            <p:ph type="title"/>
+          </p:nvPr>
+        </p:nvSpPr>
+        <p:spPr>
+          <a:xfrm>
+            <a:off x="677334" y="86208"/>
+            <a:ext cx="8596668" cy="1320800"/>
+          </a:xfrm>
+        </p:spPr>
+        <p:txBody>
+          <a:bodyPr>
+            <a:normAutofit/>
+          </a:bodyPr>
+          <a:lstStyle/>
+          <a:p>
+            <a:r>
+              <a:rPr lang="en-IN" sz="2800" dirty="0"/>
+              <a:t>Algorithm to discretize a numeric </a:t>
+            </a:r>
+            <a:r>
+              <a:rPr lang="en-IN" sz="2800" dirty="0" smtClean="0"/>
+              <a:t>attributes </a:t>
+            </a:r>
+            <a:endParaRPr lang="en-IN" sz="2800" dirty="0"/>
+          </a:p>
+        </p:txBody>
+      </p:sp>
+      <mc:AlternateContent xmlns:mc="http://schemas.openxmlformats.org/markup-compatibility/2006">
+        <mc:Choice xmlns:a14="http://schemas.microsoft.com/office/drawing/2010/main" Requires="a14">
+          <p:sp>
+            <p:nvSpPr>
+              <p:cNvPr id="7" name="Content Placeholder 6"/>
+              <p:cNvSpPr>
+                <a:spLocks noGrp="1"/>
+              </p:cNvSpPr>
+              <p:nvPr>
+                <p:ph idx="1"/>
+              </p:nvPr>
+            </p:nvSpPr>
+            <p:spPr/>
+            <p:txBody>
+              <a:bodyPr/>
+              <a:lstStyle/>
+              <a:p>
+                <a:pPr>
+                  <a:buFont typeface="+mj-lt"/>
+                  <a:buAutoNum type="arabicParenR"/>
+                </a:pPr>
+                <a:r>
+                  <a:rPr lang="en-US" dirty="0"/>
+                  <a:t>Ins[][] = Partition(</a:t>
+                </a:r>
+                <a:r>
+                  <a:rPr lang="en-US" dirty="0" err="1"/>
+                  <a:t>Ins,k</a:t>
+                </a:r>
+                <a:r>
+                  <a:rPr lang="en-US" dirty="0"/>
+                  <a:t>);//function Partition divides Ins in to k parts, stored   in 2-dimensional array </a:t>
+                </a:r>
+                <a:r>
+                  <a:rPr lang="en-US" dirty="0" err="1"/>
+                  <a:t>Inss</a:t>
+                </a:r>
+                <a:r>
+                  <a:rPr lang="en-US" dirty="0"/>
+                  <a:t>.</a:t>
+                </a:r>
+              </a:p>
+              <a:p>
+                <a:pPr>
+                  <a:buFont typeface="+mj-lt"/>
+                  <a:buAutoNum type="arabicParenR"/>
+                </a:pPr>
+                <a:r>
+                  <a:rPr lang="en-US" dirty="0"/>
+                  <a:t>Sort(</a:t>
+                </a:r>
+                <a:r>
+                  <a:rPr lang="en-US" dirty="0" err="1"/>
+                  <a:t>Inss,Att</a:t>
+                </a:r>
+                <a:r>
+                  <a:rPr lang="en-US" dirty="0"/>
+                  <a:t>);//function Sort sorts samples in all sub-datasets of </a:t>
+                </a:r>
+                <a:r>
+                  <a:rPr lang="en-US" dirty="0" err="1"/>
+                  <a:t>Inss</a:t>
+                </a:r>
+                <a:r>
+                  <a:rPr lang="en-US" dirty="0"/>
+                  <a:t> based on the value of </a:t>
+                </a:r>
+                <a:r>
+                  <a:rPr lang="en-US" dirty="0" err="1"/>
+                  <a:t>Att</a:t>
+                </a:r>
+                <a:r>
+                  <a:rPr lang="en-US" dirty="0"/>
+                  <a:t> in ascending order.</a:t>
+                </a:r>
+              </a:p>
+              <a:p>
+                <a:pPr>
+                  <a:buFont typeface="+mj-lt"/>
+                  <a:buAutoNum type="arabicParenR"/>
+                </a:pPr>
+                <a:r>
+                  <a:rPr lang="en-US" dirty="0"/>
+                  <a:t>For i</a:t>
+                </a:r>
+                <a14:m>
+                  <m:oMath xmlns:m="http://schemas.openxmlformats.org/officeDocument/2006/math">
+                    <m:r>
+                      <a:rPr lang="en-US">
+                        <a:latin typeface="Cambria Math" panose="02040503050406030204" pitchFamily="18" charset="0"/>
+                        <a:ea typeface="Cambria Math" panose="02040503050406030204" pitchFamily="18" charset="0"/>
+                      </a:rPr>
+                      <m:t> </m:t>
+                    </m:r>
+                    <m:r>
+                      <a:rPr lang="en-US" i="1">
+                        <a:latin typeface="Cambria Math" panose="02040503050406030204" pitchFamily="18" charset="0"/>
+                        <a:ea typeface="Cambria Math" panose="02040503050406030204" pitchFamily="18" charset="0"/>
+                      </a:rPr>
+                      <m:t>∈ </m:t>
+                    </m:r>
+                  </m:oMath>
+                </a14:m>
+                <a:r>
+                  <a:rPr lang="en-US" dirty="0"/>
+                  <a:t>|</a:t>
+                </a:r>
+                <a:r>
+                  <a:rPr lang="en-US" dirty="0" err="1"/>
+                  <a:t>Inss</a:t>
+                </a:r>
+                <a:r>
+                  <a:rPr lang="en-US" dirty="0"/>
+                  <a:t>|//|</a:t>
+                </a:r>
+                <a:r>
+                  <a:rPr lang="en-US" dirty="0" err="1"/>
+                  <a:t>Inss</a:t>
+                </a:r>
+                <a:r>
+                  <a:rPr lang="en-US" dirty="0"/>
+                  <a:t>| is the number of sub-datasets in </a:t>
+                </a:r>
+                <a:r>
+                  <a:rPr lang="en-US" dirty="0" err="1"/>
+                  <a:t>Inss</a:t>
+                </a:r>
+                <a:r>
+                  <a:rPr lang="en-US" dirty="0"/>
+                  <a:t>.</a:t>
+                </a:r>
+              </a:p>
+              <a:p>
+                <a:pPr>
+                  <a:buFont typeface="+mj-lt"/>
+                  <a:buAutoNum type="arabicParenR"/>
+                </a:pPr>
+                <a:r>
+                  <a:rPr lang="en-US" dirty="0"/>
+                  <a:t>    Inters[</a:t>
+                </a:r>
+                <a:r>
+                  <a:rPr lang="en-US" dirty="0" err="1"/>
+                  <a:t>i</a:t>
+                </a:r>
+                <a:r>
+                  <a:rPr lang="en-US" dirty="0"/>
+                  <a:t>] = Generate interval [Min(</a:t>
+                </a:r>
+                <a:r>
+                  <a:rPr lang="en-US" dirty="0" err="1"/>
+                  <a:t>Inss</a:t>
+                </a:r>
+                <a:r>
+                  <a:rPr lang="en-US" dirty="0"/>
+                  <a:t>[</a:t>
+                </a:r>
+                <a:r>
+                  <a:rPr lang="en-US" dirty="0" err="1"/>
+                  <a:t>i</a:t>
+                </a:r>
+                <a:r>
+                  <a:rPr lang="en-US" dirty="0"/>
+                  <a:t>],</a:t>
+                </a:r>
+                <a:r>
+                  <a:rPr lang="en-US" dirty="0" err="1"/>
+                  <a:t>Att</a:t>
+                </a:r>
+                <a:r>
+                  <a:rPr lang="en-US" dirty="0"/>
+                  <a:t>),Max(</a:t>
+                </a:r>
+                <a:r>
+                  <a:rPr lang="en-US" dirty="0" err="1"/>
+                  <a:t>Inss</a:t>
+                </a:r>
+                <a:r>
+                  <a:rPr lang="en-US" dirty="0"/>
+                  <a:t>[</a:t>
+                </a:r>
+                <a:r>
+                  <a:rPr lang="en-US" dirty="0" err="1"/>
+                  <a:t>i</a:t>
+                </a:r>
+                <a:r>
+                  <a:rPr lang="en-US" dirty="0"/>
+                  <a:t>],</a:t>
+                </a:r>
+                <a:r>
+                  <a:rPr lang="en-US" dirty="0" err="1"/>
+                  <a:t>Att</a:t>
+                </a:r>
+                <a:r>
+                  <a:rPr lang="en-US" dirty="0"/>
+                  <a:t>)] for each sub-dataset </a:t>
+                </a:r>
+                <a:r>
+                  <a:rPr lang="en-US" dirty="0" err="1"/>
+                  <a:t>Inss</a:t>
+                </a:r>
+                <a:r>
+                  <a:rPr lang="en-US" dirty="0"/>
+                  <a:t>[</a:t>
+                </a:r>
+                <a:r>
+                  <a:rPr lang="en-US" dirty="0" err="1"/>
+                  <a:t>i</a:t>
+                </a:r>
+                <a:r>
+                  <a:rPr lang="en-US" dirty="0"/>
+                  <a:t>];//Min(</a:t>
+                </a:r>
+                <a:r>
+                  <a:rPr lang="en-US" dirty="0" err="1"/>
+                  <a:t>Inss</a:t>
+                </a:r>
+                <a:r>
+                  <a:rPr lang="en-US" dirty="0"/>
+                  <a:t>(</a:t>
+                </a:r>
+                <a:r>
+                  <a:rPr lang="en-US" dirty="0" err="1"/>
+                  <a:t>i</a:t>
+                </a:r>
+                <a:r>
+                  <a:rPr lang="en-US" dirty="0"/>
+                  <a:t>)) is the minimum value of </a:t>
+                </a:r>
+                <a:r>
+                  <a:rPr lang="en-US" dirty="0" err="1"/>
+                  <a:t>Att</a:t>
+                </a:r>
+                <a:r>
+                  <a:rPr lang="en-US" dirty="0"/>
+                  <a:t> in </a:t>
+                </a:r>
+                <a:r>
+                  <a:rPr lang="en-US" dirty="0" err="1"/>
+                  <a:t>Inss</a:t>
+                </a:r>
+                <a:r>
+                  <a:rPr lang="en-US" dirty="0"/>
+                  <a:t>[</a:t>
+                </a:r>
+                <a:r>
+                  <a:rPr lang="en-US" dirty="0" err="1"/>
+                  <a:t>i</a:t>
+                </a:r>
+                <a:r>
+                  <a:rPr lang="en-US" dirty="0"/>
+                  <a:t>];Max(</a:t>
+                </a:r>
+                <a:r>
+                  <a:rPr lang="en-US" dirty="0" err="1"/>
+                  <a:t>Inss</a:t>
+                </a:r>
+                <a:r>
+                  <a:rPr lang="en-US" dirty="0"/>
+                  <a:t>[</a:t>
+                </a:r>
+                <a:r>
+                  <a:rPr lang="en-US" dirty="0" err="1"/>
+                  <a:t>i</a:t>
+                </a:r>
+                <a:r>
+                  <a:rPr lang="en-US" dirty="0" smtClean="0"/>
+                  <a:t>]) is </a:t>
+                </a:r>
+                <a:r>
+                  <a:rPr lang="en-US" dirty="0"/>
+                  <a:t>the maximum value of </a:t>
+                </a:r>
+                <a:r>
+                  <a:rPr lang="en-US" dirty="0" err="1"/>
+                  <a:t>Att</a:t>
+                </a:r>
+                <a:r>
+                  <a:rPr lang="en-US" dirty="0"/>
+                  <a:t> in </a:t>
+                </a:r>
+                <a:r>
+                  <a:rPr lang="en-US" dirty="0" err="1"/>
+                  <a:t>Inss</a:t>
+                </a:r>
+                <a:r>
+                  <a:rPr lang="en-US" dirty="0"/>
+                  <a:t>[</a:t>
+                </a:r>
+                <a:r>
+                  <a:rPr lang="en-US" dirty="0" err="1"/>
+                  <a:t>i</a:t>
+                </a:r>
+                <a:r>
+                  <a:rPr lang="en-US" dirty="0"/>
+                  <a:t>];Inters[</a:t>
+                </a:r>
+                <a:r>
+                  <a:rPr lang="en-US" dirty="0" err="1"/>
+                  <a:t>i</a:t>
+                </a:r>
+                <a:r>
+                  <a:rPr lang="en-US" dirty="0"/>
+                  <a:t>]</a:t>
+                </a:r>
+                <a:r>
+                  <a:rPr lang="en-US" dirty="0"/>
+                  <a:t> </a:t>
+                </a:r>
+                <a:r>
+                  <a:rPr lang="en-US" dirty="0"/>
+                  <a:t>is the corresponding interval of </a:t>
+                </a:r>
+                <a:r>
+                  <a:rPr lang="en-US" dirty="0" err="1"/>
+                  <a:t>Inss</a:t>
+                </a:r>
+                <a:r>
+                  <a:rPr lang="en-US" dirty="0"/>
+                  <a:t>[</a:t>
+                </a:r>
+                <a:r>
+                  <a:rPr lang="en-US" dirty="0" err="1"/>
+                  <a:t>i</a:t>
+                </a:r>
+                <a:r>
+                  <a:rPr lang="en-US" dirty="0"/>
+                  <a:t>].</a:t>
+                </a:r>
+                <a:endParaRPr lang="en-US" dirty="0"/>
+              </a:p>
+              <a:p>
+                <a:pPr>
+                  <a:buFont typeface="+mj-lt"/>
+                  <a:buAutoNum type="arabicParenR"/>
+                </a:pPr>
+                <a:r>
+                  <a:rPr lang="en-US" dirty="0" err="1"/>
+                  <a:t>End_for</a:t>
+                </a:r>
+                <a:endParaRPr lang="en-US" dirty="0"/>
+              </a:p>
+              <a:p>
+                <a:pPr>
+                  <a:buFont typeface="+mj-lt"/>
+                  <a:buAutoNum type="arabicParenR"/>
+                </a:pPr>
+                <a:endParaRPr lang="en-IN" dirty="0"/>
+              </a:p>
+            </p:txBody>
+          </p:sp>
+        </mc:Choice>
+        <mc:Fallback>
+          <p:sp>
+            <p:nvSpPr>
+              <p:cNvPr id="7" name="Content Placeholder 6"/>
+              <p:cNvSpPr>
+                <a:spLocks noGrp="1" noRot="1" noChangeAspect="1" noMove="1" noResize="1" noEditPoints="1" noAdjustHandles="1" noChangeArrowheads="1" noChangeShapeType="1" noTextEdit="1"/>
+              </p:cNvSpPr>
+              <p:nvPr>
+                <p:ph idx="1"/>
+              </p:nvPr>
+            </p:nvSpPr>
+            <p:spPr>
+              <a:blipFill rotWithShape="0">
+                <a:blip r:embed="rId2"/>
+                <a:stretch>
+                  <a:fillRect l="-213" t="-942" r="-780"/>
+                </a:stretch>
+              </a:blipFill>
+            </p:spPr>
+            <p:txBody>
+              <a:bodyPr/>
+              <a:lstStyle/>
+              <a:p>
+                <a:r>
+                  <a:rPr lang="en-IN">
+                    <a:noFill/>
+                  </a:rPr>
+                  <a:t> </a:t>
+                </a:r>
+              </a:p>
+            </p:txBody>
+          </p:sp>
+        </mc:Fallback>
+      </mc:AlternateContent>
+      <p:sp>
+        <p:nvSpPr>
           <p:cNvPr id="4" name="Date Placeholder 3"/>
           <p:cNvSpPr>
             <a:spLocks noGrp="1"/>
@@ -8329,7 +8749,7 @@
           <a:p>
             <a:fld id="{394D53E8-1B8B-4755-93F2-632F5DEDB722}" type="datetime1">
               <a:rPr lang="en-US" smtClean="0"/>
-              <a:t>14-Aug-18</a:t>
+              <a:t>8/15/2018</a:t>
             </a:fld>
             <a:endParaRPr lang="en-US"/>
           </a:p>
@@ -8480,7 +8900,7 @@
         <p:spPr>
           <a:xfrm>
             <a:off x="793446" y="1407009"/>
-            <a:ext cx="2605265" cy="646331"/>
+            <a:ext cx="8350554" cy="646331"/>
           </a:xfrm>
           <a:prstGeom prst="rect">
             <a:avLst/>
@@ -8488,7 +8908,7 @@
           <a:noFill/>
         </p:spPr>
         <p:txBody>
-          <a:bodyPr wrap="none" rtlCol="0">
+          <a:bodyPr wrap="square" rtlCol="0">
             <a:spAutoFit/>
           </a:bodyPr>
           <a:lstStyle/>
@@ -8533,7 +8953,7 @@
         <p:spPr>
           <a:xfrm>
             <a:off x="793446" y="2053340"/>
-            <a:ext cx="8220547" cy="0"/>
+            <a:ext cx="8350554" cy="0"/>
           </a:xfrm>
           <a:prstGeom prst="line">
             <a:avLst/>
@@ -8554,406 +8974,6 @@
           </a:fontRef>
         </p:style>
       </p:cxnSp>
-      <mc:AlternateContent xmlns:mc="http://schemas.openxmlformats.org/markup-compatibility/2006" xmlns:a14="http://schemas.microsoft.com/office/drawing/2010/main">
-        <mc:Choice Requires="a14">
-          <p:sp>
-            <p:nvSpPr>
-              <p:cNvPr id="16" name="TextBox 15"/>
-              <p:cNvSpPr txBox="1"/>
-              <p:nvPr/>
-            </p:nvSpPr>
-            <p:spPr>
-              <a:xfrm>
-                <a:off x="914400" y="2634558"/>
-                <a:ext cx="8229600" cy="3139321"/>
-              </a:xfrm>
-              <a:prstGeom prst="rect">
-                <a:avLst/>
-              </a:prstGeom>
-              <a:noFill/>
-            </p:spPr>
-            <p:txBody>
-              <a:bodyPr wrap="square" rtlCol="0">
-                <a:spAutoFit/>
-              </a:bodyPr>
-              <a:lstStyle/>
-              <a:p>
-                <a:pPr marL="342900" indent="-342900">
-                  <a:buFont typeface="+mj-lt"/>
-                  <a:buAutoNum type="arabicPeriod"/>
-                </a:pPr>
-                <a:r>
-                  <a:rPr lang="en-US" dirty="0" smtClean="0"/>
-                  <a:t>Ins[][] = Partition(</a:t>
-                </a:r>
-                <a:r>
-                  <a:rPr lang="en-US" dirty="0" err="1" smtClean="0"/>
-                  <a:t>Ins,k</a:t>
-                </a:r>
-                <a:r>
-                  <a:rPr lang="en-US" dirty="0" smtClean="0"/>
-                  <a:t>);//function Partition divides Ins in to k parts, stored in 2-dimensional array </a:t>
-                </a:r>
-                <a:r>
-                  <a:rPr lang="en-US" dirty="0" err="1" smtClean="0"/>
-                  <a:t>Inss</a:t>
-                </a:r>
-                <a:r>
-                  <a:rPr lang="en-US" dirty="0" smtClean="0"/>
-                  <a:t>.</a:t>
-                </a:r>
-              </a:p>
-              <a:p>
-                <a:pPr marL="342900" indent="-342900">
-                  <a:buFont typeface="+mj-lt"/>
-                  <a:buAutoNum type="arabicPeriod"/>
-                </a:pPr>
-                <a:r>
-                  <a:rPr lang="en-US" dirty="0" smtClean="0"/>
-                  <a:t>Sort(</a:t>
-                </a:r>
-                <a:r>
-                  <a:rPr lang="en-US" dirty="0" err="1" smtClean="0"/>
-                  <a:t>Inss,Att</a:t>
-                </a:r>
-                <a:r>
-                  <a:rPr lang="en-US" dirty="0" smtClean="0"/>
-                  <a:t>);//function Sort sorts samples in all sub-datasets of </a:t>
-                </a:r>
-                <a:r>
-                  <a:rPr lang="en-US" dirty="0" err="1" smtClean="0"/>
-                  <a:t>Inss</a:t>
-                </a:r>
-                <a:r>
-                  <a:rPr lang="en-US" dirty="0" smtClean="0"/>
-                  <a:t> based on the value of </a:t>
-                </a:r>
-                <a:r>
-                  <a:rPr lang="en-US" dirty="0" err="1" smtClean="0"/>
-                  <a:t>Att</a:t>
-                </a:r>
-                <a:r>
-                  <a:rPr lang="en-US" dirty="0" smtClean="0"/>
-                  <a:t> in ascending order.</a:t>
-                </a:r>
-              </a:p>
-              <a:p>
-                <a:pPr marL="342900" indent="-342900">
-                  <a:buFont typeface="+mj-lt"/>
-                  <a:buAutoNum type="arabicPeriod"/>
-                </a:pPr>
-                <a:r>
-                  <a:rPr lang="en-US" dirty="0" smtClean="0"/>
-                  <a:t>For i</a:t>
-                </a:r>
-                <a14:m>
-                  <m:oMath xmlns:m="http://schemas.openxmlformats.org/officeDocument/2006/math">
-                    <m:r>
-                      <a:rPr lang="en-US" b="0" i="0" smtClean="0">
-                        <a:latin typeface="Cambria Math" panose="02040503050406030204" pitchFamily="18" charset="0"/>
-                        <a:ea typeface="Cambria Math" panose="02040503050406030204" pitchFamily="18" charset="0"/>
-                      </a:rPr>
-                      <m:t> </m:t>
-                    </m:r>
-                    <m:r>
-                      <a:rPr lang="en-US" i="1" smtClean="0">
-                        <a:latin typeface="Cambria Math" panose="02040503050406030204" pitchFamily="18" charset="0"/>
-                        <a:ea typeface="Cambria Math" panose="02040503050406030204" pitchFamily="18" charset="0"/>
-                      </a:rPr>
-                      <m:t>∈</m:t>
-                    </m:r>
-                    <m:r>
-                      <a:rPr lang="en-US" b="0" i="1" smtClean="0">
-                        <a:latin typeface="Cambria Math" panose="02040503050406030204" pitchFamily="18" charset="0"/>
-                        <a:ea typeface="Cambria Math" panose="02040503050406030204" pitchFamily="18" charset="0"/>
-                      </a:rPr>
-                      <m:t> </m:t>
-                    </m:r>
-                  </m:oMath>
-                </a14:m>
-                <a:r>
-                  <a:rPr lang="en-US" dirty="0" smtClean="0"/>
-                  <a:t>|</a:t>
-                </a:r>
-                <a:r>
-                  <a:rPr lang="en-US" dirty="0" err="1" smtClean="0"/>
-                  <a:t>Inss</a:t>
-                </a:r>
-                <a:r>
-                  <a:rPr lang="en-US" dirty="0" smtClean="0"/>
-                  <a:t>|//|</a:t>
-                </a:r>
-                <a:r>
-                  <a:rPr lang="en-US" dirty="0" err="1" smtClean="0"/>
-                  <a:t>Inss</a:t>
-                </a:r>
-                <a:r>
-                  <a:rPr lang="en-US" dirty="0" smtClean="0"/>
-                  <a:t>| is the number of sub-datasets in </a:t>
-                </a:r>
-                <a:r>
-                  <a:rPr lang="en-US" dirty="0" err="1" smtClean="0"/>
-                  <a:t>Inss</a:t>
-                </a:r>
-                <a:r>
-                  <a:rPr lang="en-US" dirty="0" smtClean="0"/>
-                  <a:t>.</a:t>
-                </a:r>
-              </a:p>
-              <a:p>
-                <a:pPr marL="342900" indent="-342900">
-                  <a:buFont typeface="+mj-lt"/>
-                  <a:buAutoNum type="arabicPeriod"/>
-                </a:pPr>
-                <a:r>
-                  <a:rPr lang="en-US" dirty="0" smtClean="0"/>
-                  <a:t>    Inters[</a:t>
-                </a:r>
-                <a:r>
-                  <a:rPr lang="en-US" dirty="0" err="1" smtClean="0"/>
-                  <a:t>i</a:t>
-                </a:r>
-                <a:r>
-                  <a:rPr lang="en-US" dirty="0" smtClean="0"/>
-                  <a:t>] = Generate interval [Min(</a:t>
-                </a:r>
-                <a:r>
-                  <a:rPr lang="en-US" dirty="0" err="1" smtClean="0"/>
-                  <a:t>Inss</a:t>
-                </a:r>
-                <a:r>
-                  <a:rPr lang="en-US" dirty="0" smtClean="0"/>
-                  <a:t>[</a:t>
-                </a:r>
-                <a:r>
-                  <a:rPr lang="en-US" dirty="0" err="1" smtClean="0"/>
-                  <a:t>i</a:t>
-                </a:r>
-                <a:r>
-                  <a:rPr lang="en-US" dirty="0" smtClean="0"/>
-                  <a:t>],</a:t>
-                </a:r>
-                <a:r>
-                  <a:rPr lang="en-US" dirty="0" err="1" smtClean="0"/>
-                  <a:t>Att</a:t>
-                </a:r>
-                <a:r>
-                  <a:rPr lang="en-US" dirty="0" smtClean="0"/>
-                  <a:t>),Max(</a:t>
-                </a:r>
-                <a:r>
-                  <a:rPr lang="en-US" dirty="0" err="1" smtClean="0"/>
-                  <a:t>Inss</a:t>
-                </a:r>
-                <a:r>
-                  <a:rPr lang="en-US" dirty="0" smtClean="0"/>
-                  <a:t>[</a:t>
-                </a:r>
-                <a:r>
-                  <a:rPr lang="en-US" dirty="0" err="1" smtClean="0"/>
-                  <a:t>i</a:t>
-                </a:r>
-                <a:r>
-                  <a:rPr lang="en-US" dirty="0" smtClean="0"/>
-                  <a:t>],</a:t>
-                </a:r>
-                <a:r>
-                  <a:rPr lang="en-US" dirty="0" err="1" smtClean="0"/>
-                  <a:t>Att</a:t>
-                </a:r>
-                <a:r>
-                  <a:rPr lang="en-US" dirty="0" smtClean="0"/>
-                  <a:t>)] for each sub-dataset </a:t>
-                </a:r>
-                <a:r>
-                  <a:rPr lang="en-US" dirty="0" err="1" smtClean="0"/>
-                  <a:t>Inss</a:t>
-                </a:r>
-                <a:r>
-                  <a:rPr lang="en-US" dirty="0" smtClean="0"/>
-                  <a:t>[</a:t>
-                </a:r>
-                <a:r>
-                  <a:rPr lang="en-US" dirty="0" err="1" smtClean="0"/>
-                  <a:t>i</a:t>
-                </a:r>
-                <a:r>
-                  <a:rPr lang="en-US" dirty="0" smtClean="0"/>
-                  <a:t>];//Min(</a:t>
-                </a:r>
-                <a:r>
-                  <a:rPr lang="en-US" dirty="0" err="1" smtClean="0"/>
-                  <a:t>Inss</a:t>
-                </a:r>
-                <a:r>
-                  <a:rPr lang="en-US" dirty="0" smtClean="0"/>
-                  <a:t>(</a:t>
-                </a:r>
-                <a:r>
-                  <a:rPr lang="en-US" dirty="0" err="1" smtClean="0"/>
-                  <a:t>i</a:t>
-                </a:r>
-                <a:r>
-                  <a:rPr lang="en-US" dirty="0" smtClean="0"/>
-                  <a:t>)) is the minimum value of </a:t>
-                </a:r>
-                <a:r>
-                  <a:rPr lang="en-US" dirty="0" err="1" smtClean="0"/>
-                  <a:t>Att</a:t>
-                </a:r>
-                <a:r>
-                  <a:rPr lang="en-US" dirty="0" smtClean="0"/>
-                  <a:t> in </a:t>
-                </a:r>
-                <a:r>
-                  <a:rPr lang="en-US" dirty="0" err="1" smtClean="0"/>
-                  <a:t>Inss</a:t>
-                </a:r>
-                <a:r>
-                  <a:rPr lang="en-US" dirty="0" smtClean="0"/>
-                  <a:t>[</a:t>
-                </a:r>
-                <a:r>
-                  <a:rPr lang="en-US" dirty="0" err="1" smtClean="0"/>
-                  <a:t>i</a:t>
-                </a:r>
-                <a:r>
-                  <a:rPr lang="en-US" dirty="0" smtClean="0"/>
-                  <a:t>];Max(</a:t>
-                </a:r>
-                <a:r>
-                  <a:rPr lang="en-US" dirty="0" err="1" smtClean="0"/>
-                  <a:t>Inss</a:t>
-                </a:r>
-                <a:r>
-                  <a:rPr lang="en-US" dirty="0" smtClean="0"/>
-                  <a:t>[</a:t>
-                </a:r>
-                <a:r>
-                  <a:rPr lang="en-US" dirty="0" err="1" smtClean="0"/>
-                  <a:t>i</a:t>
-                </a:r>
-                <a:r>
-                  <a:rPr lang="en-US" dirty="0" smtClean="0"/>
-                  <a:t>]) is the maximum value of </a:t>
-                </a:r>
-                <a:r>
-                  <a:rPr lang="en-US" dirty="0" err="1" smtClean="0"/>
-                  <a:t>Att</a:t>
-                </a:r>
-                <a:r>
-                  <a:rPr lang="en-US" dirty="0" smtClean="0"/>
-                  <a:t> in </a:t>
-                </a:r>
-                <a:r>
-                  <a:rPr lang="en-US" dirty="0" err="1" smtClean="0"/>
-                  <a:t>Inss</a:t>
-                </a:r>
-                <a:r>
-                  <a:rPr lang="en-US" dirty="0" smtClean="0"/>
-                  <a:t>[</a:t>
-                </a:r>
-                <a:r>
-                  <a:rPr lang="en-US" dirty="0" err="1" smtClean="0"/>
-                  <a:t>i</a:t>
-                </a:r>
-                <a:r>
-                  <a:rPr lang="en-US" dirty="0" smtClean="0"/>
-                  <a:t>];Inters[</a:t>
-                </a:r>
-                <a:r>
-                  <a:rPr lang="en-US" dirty="0" err="1" smtClean="0"/>
-                  <a:t>i</a:t>
-                </a:r>
-                <a:r>
-                  <a:rPr lang="en-US" dirty="0" smtClean="0"/>
-                  <a:t>]</a:t>
-                </a:r>
-                <a:r>
-                  <a:rPr lang="en-US" dirty="0"/>
-                  <a:t> </a:t>
-                </a:r>
-                <a:r>
-                  <a:rPr lang="en-US" dirty="0" smtClean="0"/>
-                  <a:t>is the corresponding interval of </a:t>
-                </a:r>
-                <a:r>
-                  <a:rPr lang="en-US" dirty="0" err="1" smtClean="0"/>
-                  <a:t>Inss</a:t>
-                </a:r>
-                <a:r>
-                  <a:rPr lang="en-US" dirty="0" smtClean="0"/>
-                  <a:t>[</a:t>
-                </a:r>
-                <a:r>
-                  <a:rPr lang="en-US" dirty="0" err="1" smtClean="0"/>
-                  <a:t>i</a:t>
-                </a:r>
-                <a:r>
-                  <a:rPr lang="en-US" dirty="0" smtClean="0"/>
-                  <a:t>].</a:t>
-                </a:r>
-              </a:p>
-              <a:p>
-                <a:pPr marL="342900" indent="-342900">
-                  <a:buFont typeface="+mj-lt"/>
-                  <a:buAutoNum type="arabicPeriod"/>
-                </a:pPr>
-                <a:r>
-                  <a:rPr lang="en-US" dirty="0" err="1" smtClean="0"/>
-                  <a:t>End_for</a:t>
-                </a:r>
-                <a:endParaRPr lang="en-US" dirty="0" smtClean="0"/>
-              </a:p>
-              <a:p>
-                <a:pPr marL="342900" indent="-342900">
-                  <a:buFont typeface="+mj-lt"/>
-                  <a:buAutoNum type="arabicPeriod"/>
-                </a:pPr>
-                <a:endParaRPr lang="en-US" dirty="0"/>
-              </a:p>
-            </p:txBody>
-          </p:sp>
-        </mc:Choice>
-        <mc:Fallback xmlns="">
-          <p:sp>
-            <p:nvSpPr>
-              <p:cNvPr id="16" name="TextBox 15"/>
-              <p:cNvSpPr txBox="1">
-                <a:spLocks noRot="1" noChangeAspect="1" noMove="1" noResize="1" noEditPoints="1" noAdjustHandles="1" noChangeArrowheads="1" noChangeShapeType="1" noTextEdit="1"/>
-              </p:cNvSpPr>
-              <p:nvPr/>
-            </p:nvSpPr>
-            <p:spPr>
-              <a:xfrm>
-                <a:off x="914400" y="2634558"/>
-                <a:ext cx="8229600" cy="3139321"/>
-              </a:xfrm>
-              <a:prstGeom prst="rect">
-                <a:avLst/>
-              </a:prstGeom>
-              <a:blipFill rotWithShape="0">
-                <a:blip r:embed="rId2"/>
-                <a:stretch>
-                  <a:fillRect l="-519" t="-1165"/>
-                </a:stretch>
-              </a:blipFill>
-            </p:spPr>
-            <p:txBody>
-              <a:bodyPr/>
-              <a:lstStyle/>
-              <a:p>
-                <a:r>
-                  <a:rPr lang="en-US">
-                    <a:noFill/>
-                  </a:rPr>
-                  <a:t> </a:t>
-                </a:r>
-              </a:p>
-            </p:txBody>
-          </p:sp>
-        </mc:Fallback>
-      </mc:AlternateContent>
     </p:spTree>
     <p:extLst>
       <p:ext uri="{BB962C8B-B14F-4D97-AF65-F5344CB8AC3E}">
@@ -8984,8 +9004,30 @@
           <a:chExt cx="0" cy="0"/>
         </a:xfrm>
       </p:grpSpPr>
-      <mc:AlternateContent xmlns:mc="http://schemas.openxmlformats.org/markup-compatibility/2006" xmlns:a14="http://schemas.microsoft.com/office/drawing/2010/main">
-        <mc:Choice Requires="a14">
+      <p:sp>
+        <p:nvSpPr>
+          <p:cNvPr id="2" name="Title 1"/>
+          <p:cNvSpPr>
+            <a:spLocks noGrp="1"/>
+          </p:cNvSpPr>
+          <p:nvPr>
+            <p:ph type="title"/>
+          </p:nvPr>
+        </p:nvSpPr>
+        <p:spPr/>
+        <p:txBody>
+          <a:bodyPr/>
+          <a:lstStyle/>
+          <a:p>
+            <a:r>
+              <a:rPr lang="en-IN" dirty="0"/>
+              <a:t>Algorithm to discretize a numeric attributes </a:t>
+            </a:r>
+          </a:p>
+        </p:txBody>
+      </p:sp>
+      <mc:AlternateContent xmlns:mc="http://schemas.openxmlformats.org/markup-compatibility/2006">
+        <mc:Choice xmlns:a14="http://schemas.microsoft.com/office/drawing/2010/main" Requires="a14">
           <p:sp>
             <p:nvSpPr>
               <p:cNvPr id="3" name="Content Placeholder 2"/>
@@ -8996,21 +9038,15 @@
                 <p:ph idx="1"/>
               </p:nvPr>
             </p:nvSpPr>
-            <p:spPr>
-              <a:xfrm>
-                <a:off x="677334" y="1237136"/>
-                <a:ext cx="8596668" cy="3880773"/>
-              </a:xfrm>
-            </p:spPr>
+            <p:spPr/>
             <p:txBody>
               <a:bodyPr>
-                <a:normAutofit fontScale="92500"/>
+                <a:noAutofit/>
               </a:bodyPr>
               <a:lstStyle/>
               <a:p>
                 <a:pPr>
-                  <a:buFont typeface="+mj-lt"/>
-                  <a:buAutoNum type="arabicPeriod"/>
+                  <a:buAutoNum type="arabicParenR" startAt="6"/>
                 </a:pPr>
                 <a:r>
                   <a:rPr lang="en-US" dirty="0" smtClean="0"/>
@@ -9024,21 +9060,18 @@
                   <m:oMath xmlns:m="http://schemas.openxmlformats.org/officeDocument/2006/math">
                     <m:r>
                       <a:rPr lang="en-US" b="0" i="0" smtClean="0">
-                        <a:latin typeface="Cambria Math" panose="02040503050406030204" pitchFamily="18" charset="0"/>
                         <a:ea typeface="Cambria Math" panose="02040503050406030204" pitchFamily="18" charset="0"/>
                       </a:rPr>
                       <m:t> </m:t>
                     </m:r>
                     <m:r>
                       <a:rPr lang="en-US" i="1" smtClean="0">
-                        <a:latin typeface="Cambria Math" panose="02040503050406030204" pitchFamily="18" charset="0"/>
                         <a:ea typeface="Cambria Math" panose="02040503050406030204" pitchFamily="18" charset="0"/>
                       </a:rPr>
                       <m:t>∈</m:t>
                     </m:r>
                     <m:r>
                       <a:rPr lang="en-US" b="0" i="1" smtClean="0">
-                        <a:latin typeface="Cambria Math" panose="02040503050406030204" pitchFamily="18" charset="0"/>
                         <a:ea typeface="Cambria Math" panose="02040503050406030204" pitchFamily="18" charset="0"/>
                       </a:rPr>
                       <m:t> </m:t>
@@ -9047,96 +9080,94 @@
                 </a14:m>
                 <a:r>
                   <a:rPr lang="en-US" dirty="0" smtClean="0"/>
-                  <a:t>|Inters|//|Inters| is the number of intervals</a:t>
-                </a:r>
-              </a:p>
-              <a:p>
-                <a:pPr>
-                  <a:buFont typeface="+mj-lt"/>
-                  <a:buAutoNum type="arabicPeriod"/>
-                </a:pPr>
-                <a:r>
-                  <a:rPr lang="en-US" dirty="0"/>
-                  <a:t> </a:t>
+                  <a:t>|Inters|//|Inters| is the number of </a:t>
                 </a:r>
                 <a:r>
                   <a:rPr lang="en-US" dirty="0" smtClean="0"/>
-                  <a:t>     </a:t>
-                </a:r>
-                <a:r>
-                  <a:rPr lang="en-US" dirty="0" err="1" smtClean="0"/>
-                  <a:t>subInts</a:t>
-                </a:r>
-                <a:r>
-                  <a:rPr lang="en-US" dirty="0" smtClean="0"/>
-                  <a:t>[</a:t>
-                </a:r>
-                <a:r>
-                  <a:rPr lang="en-US" dirty="0" err="1" smtClean="0"/>
-                  <a:t>i</a:t>
-                </a:r>
-                <a:r>
-                  <a:rPr lang="en-US" dirty="0" smtClean="0"/>
-                  <a:t>][] = Split(Inters[</a:t>
-                </a:r>
-                <a:r>
-                  <a:rPr lang="en-US" dirty="0" err="1" smtClean="0"/>
-                  <a:t>i</a:t>
-                </a:r>
-                <a:r>
-                  <a:rPr lang="en-US" dirty="0" smtClean="0"/>
-                  <a:t>]);//function Split divides each Inters[</a:t>
-                </a:r>
-                <a:r>
-                  <a:rPr lang="en-US" dirty="0" err="1" smtClean="0"/>
-                  <a:t>i</a:t>
-                </a:r>
-                <a:r>
-                  <a:rPr lang="en-US" dirty="0" smtClean="0"/>
-                  <a:t>] into independent sub-intervals based on numerical continuity and stores them in array </a:t>
-                </a:r>
-                <a:r>
-                  <a:rPr lang="en-US" dirty="0" err="1" smtClean="0"/>
-                  <a:t>subInts</a:t>
-                </a:r>
-                <a:r>
-                  <a:rPr lang="en-US" dirty="0" smtClean="0"/>
-                  <a:t>[</a:t>
-                </a:r>
-                <a:r>
-                  <a:rPr lang="en-US" dirty="0" err="1" smtClean="0"/>
-                  <a:t>i</a:t>
-                </a:r>
-                <a:r>
-                  <a:rPr lang="en-US" dirty="0" smtClean="0"/>
-                  <a:t>][].</a:t>
-                </a:r>
-              </a:p>
-              <a:p>
-                <a:pPr>
-                  <a:buFont typeface="+mj-lt"/>
-                  <a:buAutoNum type="arabicPeriod"/>
-                </a:pPr>
-                <a:r>
-                  <a:rPr lang="en-US" dirty="0" err="1" smtClean="0"/>
-                  <a:t>End_for</a:t>
+                  <a:t>intervals</a:t>
                 </a:r>
                 <a:endParaRPr lang="en-US" dirty="0"/>
               </a:p>
               <a:p>
                 <a:pPr>
-                  <a:buFont typeface="+mj-lt"/>
-                  <a:buAutoNum type="arabicPeriod"/>
+                  <a:buAutoNum type="arabicParenR" startAt="6"/>
                 </a:pPr>
                 <a:r>
+                  <a:rPr lang="en-US" dirty="0" err="1" smtClean="0"/>
+                  <a:t>subInts</a:t>
+                </a:r>
+                <a:r>
                   <a:rPr lang="en-US" dirty="0" smtClean="0"/>
-                  <a:t>For I </a:t>
+                  <a:t>[</a:t>
+                </a:r>
+                <a:r>
+                  <a:rPr lang="en-US" dirty="0" err="1" smtClean="0"/>
+                  <a:t>i</a:t>
+                </a:r>
+                <a:r>
+                  <a:rPr lang="en-US" dirty="0" smtClean="0"/>
+                  <a:t>][] = Split(Inters[</a:t>
+                </a:r>
+                <a:r>
+                  <a:rPr lang="en-US" dirty="0" err="1" smtClean="0"/>
+                  <a:t>i</a:t>
+                </a:r>
+                <a:r>
+                  <a:rPr lang="en-US" dirty="0" smtClean="0"/>
+                  <a:t>]);//function Split divides each Inters[</a:t>
+                </a:r>
+                <a:r>
+                  <a:rPr lang="en-US" dirty="0" err="1" smtClean="0"/>
+                  <a:t>i</a:t>
+                </a:r>
+                <a:r>
+                  <a:rPr lang="en-US" dirty="0" smtClean="0"/>
+                  <a:t>] into independent sub-intervals based on numerical continuity and stores them in array </a:t>
+                </a:r>
+                <a:r>
+                  <a:rPr lang="en-US" dirty="0" err="1" smtClean="0"/>
+                  <a:t>subInts</a:t>
+                </a:r>
+                <a:r>
+                  <a:rPr lang="en-US" dirty="0" smtClean="0"/>
+                  <a:t>[</a:t>
+                </a:r>
+                <a:r>
+                  <a:rPr lang="en-US" dirty="0" err="1" smtClean="0"/>
+                  <a:t>i</a:t>
+                </a:r>
+                <a:r>
+                  <a:rPr lang="en-US" dirty="0" smtClean="0"/>
+                  <a:t>][].</a:t>
+                </a:r>
+                <a:endParaRPr lang="en-US" dirty="0"/>
+              </a:p>
+              <a:p>
+                <a:pPr>
+                  <a:buAutoNum type="arabicParenR" startAt="6"/>
+                </a:pPr>
+                <a:r>
+                  <a:rPr lang="en-US" dirty="0" err="1" smtClean="0"/>
+                  <a:t>End_for</a:t>
+                </a:r>
+                <a:endParaRPr lang="en-US" dirty="0"/>
+              </a:p>
+              <a:p>
+                <a:pPr>
+                  <a:buAutoNum type="arabicParenR" startAt="6"/>
+                </a:pPr>
+                <a:r>
+                  <a:rPr lang="en-US" dirty="0" smtClean="0"/>
+                  <a:t>For </a:t>
+                </a:r>
+                <a:r>
+                  <a:rPr lang="en-US" dirty="0" smtClean="0"/>
+                  <a:t>I </a:t>
                 </a:r>
                 <a14:m>
                   <m:oMath xmlns:m="http://schemas.openxmlformats.org/officeDocument/2006/math">
                     <m:r>
                       <a:rPr lang="en-US" i="1">
-                        <a:latin typeface="Cambria Math" panose="02040503050406030204" pitchFamily="18" charset="0"/>
                         <a:ea typeface="Cambria Math" panose="02040503050406030204" pitchFamily="18" charset="0"/>
                       </a:rPr>
                       <m:t>∈ </m:t>
@@ -9161,21 +9192,21 @@
                 </a:r>
                 <a:r>
                   <a:rPr lang="en-US" dirty="0" smtClean="0"/>
-                  <a:t>| is the number of total sub-intervals.</a:t>
-                </a:r>
+                  <a:t>| is the number of total </a:t>
+                </a:r>
+                <a:r>
+                  <a:rPr lang="en-US" dirty="0" smtClean="0"/>
+                  <a:t>sub-intervals.</a:t>
+                </a:r>
+                <a:endParaRPr lang="en-US" dirty="0"/>
               </a:p>
               <a:p>
                 <a:pPr>
-                  <a:buFont typeface="+mj-lt"/>
-                  <a:buAutoNum type="arabicPeriod"/>
+                  <a:buAutoNum type="arabicParenR" startAt="6"/>
                 </a:pPr>
                 <a:r>
-                  <a:rPr lang="en-US" dirty="0"/>
-                  <a:t> </a:t>
-                </a:r>
-                <a:r>
                   <a:rPr lang="en-US" dirty="0" smtClean="0"/>
-                  <a:t>     Merge(</a:t>
+                  <a:t>Merge(</a:t>
                 </a:r>
                 <a:r>
                   <a:rPr lang="en-US" dirty="0" err="1" smtClean="0"/>
@@ -9183,13 +9214,17 @@
                 </a:r>
                 <a:r>
                   <a:rPr lang="en-US" dirty="0" smtClean="0"/>
-                  <a:t>);//function Merge combines adjacent sub-intervals based              	on the three basic rules.</a:t>
-                </a:r>
+                  <a:t>);//function Merge combines adjacent sub-intervals based              	on the three basic </a:t>
+                </a:r>
+                <a:r>
+                  <a:rPr lang="en-US" dirty="0" smtClean="0"/>
+                  <a:t>rules.</a:t>
+                </a:r>
+                <a:endParaRPr lang="en-US" dirty="0"/>
               </a:p>
               <a:p>
                 <a:pPr>
-                  <a:buFont typeface="+mj-lt"/>
-                  <a:buAutoNum type="arabicPeriod"/>
+                  <a:buAutoNum type="arabicParenR" startAt="6"/>
                 </a:pPr>
                 <a:r>
                   <a:rPr lang="en-US" dirty="0" err="1" smtClean="0"/>
@@ -9200,7 +9235,7 @@
             </p:txBody>
           </p:sp>
         </mc:Choice>
-        <mc:Fallback xmlns="">
+        <mc:Fallback>
           <p:sp>
             <p:nvSpPr>
               <p:cNvPr id="3" name="Content Placeholder 2"/>
@@ -9212,14 +9247,10 @@
               </p:nvPr>
             </p:nvSpPr>
             <p:spPr>
-              <a:xfrm>
-                <a:off x="677334" y="1237136"/>
-                <a:ext cx="8596668" cy="3880773"/>
-              </a:xfrm>
               <a:blipFill rotWithShape="0">
                 <a:blip r:embed="rId2"/>
                 <a:stretch>
-                  <a:fillRect l="-71" t="-628" r="-2979"/>
+                  <a:fillRect l="-213" t="-942" r="-4043"/>
                 </a:stretch>
               </a:blipFill>
             </p:spPr>
@@ -9228,7 +9259,7 @@
               <a:lstStyle/>
               <a:p>
                 <a:r>
-                  <a:rPr lang="en-US">
+                  <a:rPr lang="en-IN">
                     <a:noFill/>
                   </a:rPr>
                   <a:t> </a:t>
@@ -9255,7 +9286,7 @@
           <a:p>
             <a:fld id="{394D53E8-1B8B-4755-93F2-632F5DEDB722}" type="datetime1">
               <a:rPr lang="en-US" smtClean="0"/>
-              <a:t>14-Aug-18</a:t>
+              <a:t>8/15/2018</a:t>
             </a:fld>
             <a:endParaRPr lang="en-US"/>
           </a:p>
@@ -9277,10 +9308,10 @@
           <a:lstStyle/>
           <a:p>
             <a:r>
-              <a:rPr lang="en-US" smtClean="0"/>
+              <a:rPr lang="en-US" dirty="0" err="1" smtClean="0"/>
               <a:t>N.L.Veerendra,K.Gangadhar,P.R.Surya</a:t>
             </a:r>
-            <a:endParaRPr lang="en-US"/>
+            <a:endParaRPr lang="en-US" dirty="0"/>
           </a:p>
         </p:txBody>
       </p:sp>
@@ -9339,7 +9370,7 @@
       </p:grpSpPr>
       <p:sp>
         <p:nvSpPr>
-          <p:cNvPr id="2" name="Title 1"/>
+          <p:cNvPr id="14" name="Title 13"/>
           <p:cNvSpPr>
             <a:spLocks noGrp="1"/>
           </p:cNvSpPr>
@@ -9347,123 +9378,192 @@
             <p:ph type="title"/>
           </p:nvPr>
         </p:nvSpPr>
+        <p:spPr>
+          <a:xfrm>
+            <a:off x="713547" y="86207"/>
+            <a:ext cx="8596668" cy="1320800"/>
+          </a:xfrm>
+        </p:spPr>
+        <p:txBody>
+          <a:bodyPr/>
+          <a:lstStyle/>
+          <a:p>
+            <a:r>
+              <a:rPr lang="en-IN" dirty="0"/>
+              <a:t>Improved Id3 algorithm. </a:t>
+            </a:r>
+            <a:endParaRPr lang="en-IN" dirty="0"/>
+          </a:p>
+        </p:txBody>
+      </p:sp>
+      <p:sp>
+        <p:nvSpPr>
+          <p:cNvPr id="13" name="Content Placeholder 2"/>
+          <p:cNvSpPr>
+            <a:spLocks noGrp="1"/>
+          </p:cNvSpPr>
+          <p:nvPr>
+            <p:ph idx="1"/>
+          </p:nvPr>
+        </p:nvSpPr>
+        <p:spPr>
+          <a:xfrm>
+            <a:off x="677334" y="2343151"/>
+            <a:ext cx="8596668" cy="3880773"/>
+          </a:xfrm>
+        </p:spPr>
+        <p:txBody>
+          <a:bodyPr>
+            <a:normAutofit/>
+          </a:bodyPr>
+          <a:lstStyle/>
+          <a:p>
+            <a:pPr>
+              <a:buFont typeface="+mj-lt"/>
+              <a:buAutoNum type="arabicPeriod"/>
+            </a:pPr>
+            <a:r>
+              <a:rPr lang="en-US" dirty="0" smtClean="0"/>
+              <a:t>Create </a:t>
+            </a:r>
+            <a:r>
+              <a:rPr lang="en-US" dirty="0"/>
+              <a:t>a node M </a:t>
+            </a:r>
+            <a:endParaRPr lang="en-US" dirty="0" smtClean="0"/>
+          </a:p>
+          <a:p>
+            <a:pPr>
+              <a:buFont typeface="+mj-lt"/>
+              <a:buAutoNum type="arabicPeriod"/>
+            </a:pPr>
+            <a:r>
+              <a:rPr lang="en-US" dirty="0" smtClean="0"/>
+              <a:t>If </a:t>
+            </a:r>
+            <a:r>
+              <a:rPr lang="en-US" dirty="0"/>
+              <a:t>all instances in a sub-dataset are in the same class (e.g. C), execute (3</a:t>
+            </a:r>
+            <a:r>
+              <a:rPr lang="en-US" dirty="0" smtClean="0"/>
+              <a:t>)</a:t>
+            </a:r>
+          </a:p>
+          <a:p>
+            <a:pPr>
+              <a:buFont typeface="+mj-lt"/>
+              <a:buAutoNum type="arabicPeriod"/>
+            </a:pPr>
+            <a:r>
+              <a:rPr lang="en-US" dirty="0" smtClean="0"/>
+              <a:t>Return </a:t>
+            </a:r>
+            <a:r>
+              <a:rPr lang="en-US" dirty="0"/>
+              <a:t>M as a leaf node and mark it with class C </a:t>
+            </a:r>
+            <a:endParaRPr lang="en-US" dirty="0" smtClean="0"/>
+          </a:p>
+          <a:p>
+            <a:pPr>
+              <a:buFont typeface="+mj-lt"/>
+              <a:buAutoNum type="arabicPeriod"/>
+            </a:pPr>
+            <a:r>
+              <a:rPr lang="en-US" dirty="0" smtClean="0"/>
+              <a:t>If </a:t>
+            </a:r>
+            <a:r>
+              <a:rPr lang="en-US" dirty="0"/>
+              <a:t>attribute list is empty, then execute (5) </a:t>
+            </a:r>
+            <a:endParaRPr lang="en-US" dirty="0" smtClean="0"/>
+          </a:p>
+          <a:p>
+            <a:pPr>
+              <a:buFont typeface="+mj-lt"/>
+              <a:buAutoNum type="arabicPeriod"/>
+            </a:pPr>
+            <a:r>
+              <a:rPr lang="en-US" dirty="0" smtClean="0"/>
+              <a:t>Return </a:t>
+            </a:r>
+            <a:r>
+              <a:rPr lang="en-US" dirty="0"/>
+              <a:t>M as a leaf node and mark it with the majority class in the dataset </a:t>
+            </a:r>
+            <a:endParaRPr lang="en-US" dirty="0" smtClean="0"/>
+          </a:p>
+          <a:p>
+            <a:pPr>
+              <a:buFont typeface="+mj-lt"/>
+              <a:buAutoNum type="arabicPeriod"/>
+            </a:pPr>
+            <a:r>
+              <a:rPr lang="en-US" dirty="0" smtClean="0"/>
+              <a:t>If </a:t>
+            </a:r>
+            <a:r>
+              <a:rPr lang="en-US" dirty="0"/>
+              <a:t>attribute list is not empty, then select an attribute with the greatest </a:t>
+            </a:r>
+            <a:r>
+              <a:rPr lang="en-US" dirty="0" err="1"/>
+              <a:t>InfoGain</a:t>
+            </a:r>
+            <a:r>
+              <a:rPr lang="en-US" dirty="0"/>
+              <a:t>/f(n) from the attribute list as a test attribute </a:t>
+            </a:r>
+            <a:endParaRPr lang="en-US" dirty="0" smtClean="0"/>
+          </a:p>
+          <a:p>
+            <a:pPr>
+              <a:buFont typeface="+mj-lt"/>
+              <a:buAutoNum type="arabicPeriod"/>
+            </a:pPr>
+            <a:r>
+              <a:rPr lang="en-US" dirty="0" smtClean="0"/>
+              <a:t>Mark </a:t>
+            </a:r>
+            <a:r>
+              <a:rPr lang="en-US" dirty="0"/>
+              <a:t>the node M as the test attribute </a:t>
+            </a:r>
+            <a:endParaRPr lang="en-US" dirty="0" smtClean="0"/>
+          </a:p>
+          <a:p>
+            <a:pPr>
+              <a:buFont typeface="+mj-lt"/>
+              <a:buAutoNum type="arabicPeriod"/>
+            </a:pPr>
+            <a:r>
+              <a:rPr lang="en-US" dirty="0"/>
+              <a:t>(8) If it is a numeric attribute, discretize it based on the class attribute values; Then execute (9) </a:t>
+            </a:r>
+            <a:endParaRPr lang="en-US" dirty="0" smtClean="0"/>
+          </a:p>
+        </p:txBody>
+      </p:sp>
+      <p:sp>
+        <p:nvSpPr>
+          <p:cNvPr id="4" name="Date Placeholder 3"/>
+          <p:cNvSpPr>
+            <a:spLocks noGrp="1"/>
+          </p:cNvSpPr>
+          <p:nvPr>
+            <p:ph type="dt" sz="half" idx="10"/>
+          </p:nvPr>
+        </p:nvSpPr>
         <p:spPr/>
         <p:txBody>
           <a:bodyPr/>
           <a:lstStyle/>
           <a:p>
-            <a:r>
-              <a:rPr lang="en-US" dirty="0"/>
-              <a:t>Improved Id3 </a:t>
-            </a:r>
-            <a:r>
-              <a:rPr lang="en-US" dirty="0" smtClean="0"/>
-              <a:t>algorithm</a:t>
-            </a:r>
-            <a:r>
-              <a:rPr lang="en-US" dirty="0"/>
-              <a:t/>
-            </a:r>
-            <a:br>
-              <a:rPr lang="en-US" dirty="0"/>
-            </a:br>
-            <a:endParaRPr lang="en-US" dirty="0"/>
-          </a:p>
-        </p:txBody>
-      </p:sp>
-      <p:sp>
-        <p:nvSpPr>
-          <p:cNvPr id="3" name="Content Placeholder 2"/>
-          <p:cNvSpPr>
-            <a:spLocks noGrp="1"/>
-          </p:cNvSpPr>
-          <p:nvPr>
-            <p:ph idx="1"/>
-          </p:nvPr>
-        </p:nvSpPr>
-        <p:spPr/>
-        <p:txBody>
-          <a:bodyPr/>
-          <a:lstStyle/>
-          <a:p>
-            <a:r>
-              <a:rPr lang="en-US" dirty="0" smtClean="0"/>
-              <a:t>Id3_improved </a:t>
-            </a:r>
-            <a:r>
-              <a:rPr lang="en-US" dirty="0"/>
-              <a:t>algorithm: </a:t>
-            </a:r>
-            <a:r>
-              <a:rPr lang="en-US" dirty="0" err="1"/>
-              <a:t>Generate_Decision_tree</a:t>
-            </a:r>
-            <a:r>
-              <a:rPr lang="en-US" dirty="0"/>
-              <a:t>( </a:t>
-            </a:r>
-            <a:r>
-              <a:rPr lang="en-US" i="1" dirty="0"/>
-              <a:t>S </a:t>
-            </a:r>
-            <a:r>
-              <a:rPr lang="en-US" dirty="0"/>
-              <a:t>, attribute list). </a:t>
-            </a:r>
-            <a:r>
-              <a:rPr lang="en-US" i="1" dirty="0"/>
-              <a:t>S </a:t>
-            </a:r>
-            <a:r>
-              <a:rPr lang="en-US" dirty="0"/>
-              <a:t>is a training dataset. </a:t>
-            </a:r>
-            <a:endParaRPr lang="en-US" dirty="0" smtClean="0"/>
-          </a:p>
-          <a:p>
-            <a:r>
-              <a:rPr lang="en-US" dirty="0" smtClean="0"/>
-              <a:t>Input</a:t>
-            </a:r>
-            <a:r>
-              <a:rPr lang="en-US" dirty="0"/>
-              <a:t>: training dataset; numeric class attribute is discretized before constructing a classifier model</a:t>
-            </a:r>
-            <a:r>
-              <a:rPr lang="en-US" dirty="0" smtClean="0"/>
-              <a:t>.</a:t>
-            </a:r>
-          </a:p>
-          <a:p>
-            <a:r>
-              <a:rPr lang="en-US" dirty="0" smtClean="0"/>
-              <a:t> </a:t>
-            </a:r>
-            <a:r>
-              <a:rPr lang="en-US" dirty="0"/>
-              <a:t>Output: a rule-based classifier model. </a:t>
-            </a:r>
-          </a:p>
-        </p:txBody>
-      </p:sp>
-      <p:sp>
-        <p:nvSpPr>
-          <p:cNvPr id="4" name="Date Placeholder 3"/>
-          <p:cNvSpPr>
-            <a:spLocks noGrp="1"/>
-          </p:cNvSpPr>
-          <p:nvPr>
-            <p:ph type="dt" sz="half" idx="10"/>
-          </p:nvPr>
-        </p:nvSpPr>
-        <p:spPr/>
-        <p:txBody>
-          <a:bodyPr/>
-          <a:lstStyle/>
-          <a:p>
             <a:fld id="{394D53E8-1B8B-4755-93F2-632F5DEDB722}" type="datetime1">
               <a:rPr lang="en-US" smtClean="0"/>
-              <a:t>14-Aug-18</a:t>
+              <a:t>8/15/2018</a:t>
             </a:fld>
             <a:endParaRPr lang="en-US"/>
           </a:p>
@@ -9515,6 +9615,161 @@
           </a:p>
         </p:txBody>
       </p:sp>
+      <p:sp>
+        <p:nvSpPr>
+          <p:cNvPr id="7" name="Rectangle 6"/>
+          <p:cNvSpPr/>
+          <p:nvPr/>
+        </p:nvSpPr>
+        <p:spPr>
+          <a:xfrm>
+            <a:off x="764177" y="760679"/>
+            <a:ext cx="8422982" cy="646331"/>
+          </a:xfrm>
+          <a:prstGeom prst="rect">
+            <a:avLst/>
+          </a:prstGeom>
+        </p:spPr>
+        <p:txBody>
+          <a:bodyPr wrap="square">
+            <a:spAutoFit/>
+          </a:bodyPr>
+          <a:lstStyle/>
+          <a:p>
+            <a:r>
+              <a:rPr lang="en-US" dirty="0"/>
+              <a:t>Id3_improved algorithm: </a:t>
+            </a:r>
+            <a:r>
+              <a:rPr lang="en-US" dirty="0" err="1"/>
+              <a:t>Generate_Decision_tree</a:t>
+            </a:r>
+            <a:r>
+              <a:rPr lang="en-US" dirty="0"/>
+              <a:t>( </a:t>
+            </a:r>
+            <a:r>
+              <a:rPr lang="en-US" i="1" dirty="0"/>
+              <a:t>S </a:t>
+            </a:r>
+            <a:r>
+              <a:rPr lang="en-US" dirty="0"/>
+              <a:t>, attribute list). </a:t>
+            </a:r>
+            <a:r>
+              <a:rPr lang="en-US" i="1" dirty="0"/>
+              <a:t>S </a:t>
+            </a:r>
+            <a:r>
+              <a:rPr lang="en-US" dirty="0"/>
+              <a:t>is a training dataset. </a:t>
+            </a:r>
+          </a:p>
+        </p:txBody>
+      </p:sp>
+      <p:cxnSp>
+        <p:nvCxnSpPr>
+          <p:cNvPr id="8" name="Straight Connector 7"/>
+          <p:cNvCxnSpPr/>
+          <p:nvPr/>
+        </p:nvCxnSpPr>
+        <p:spPr>
+          <a:xfrm>
+            <a:off x="793446" y="1407009"/>
+            <a:ext cx="8350554" cy="0"/>
+          </a:xfrm>
+          <a:prstGeom prst="line">
+            <a:avLst/>
+          </a:prstGeom>
+        </p:spPr>
+        <p:style>
+          <a:lnRef idx="1">
+            <a:schemeClr val="accent1"/>
+          </a:lnRef>
+          <a:fillRef idx="0">
+            <a:schemeClr val="accent1"/>
+          </a:fillRef>
+          <a:effectRef idx="0">
+            <a:schemeClr val="accent1"/>
+          </a:effectRef>
+          <a:fontRef idx="minor">
+            <a:schemeClr val="tx1"/>
+          </a:fontRef>
+        </p:style>
+      </p:cxnSp>
+      <p:sp>
+        <p:nvSpPr>
+          <p:cNvPr id="9" name="TextBox 8"/>
+          <p:cNvSpPr txBox="1"/>
+          <p:nvPr/>
+        </p:nvSpPr>
+        <p:spPr>
+          <a:xfrm>
+            <a:off x="793446" y="1407008"/>
+            <a:ext cx="8350554" cy="923330"/>
+          </a:xfrm>
+          <a:prstGeom prst="rect">
+            <a:avLst/>
+          </a:prstGeom>
+          <a:noFill/>
+        </p:spPr>
+        <p:txBody>
+          <a:bodyPr wrap="square" rtlCol="0">
+            <a:spAutoFit/>
+          </a:bodyPr>
+          <a:lstStyle/>
+          <a:p>
+            <a:r>
+              <a:rPr lang="en-US" dirty="0"/>
+              <a:t>Input: training dataset; numeric class attribute is discretized before constructing a classifier model</a:t>
+            </a:r>
+            <a:r>
+              <a:rPr lang="en-US" dirty="0" smtClean="0"/>
+              <a:t>.</a:t>
+            </a:r>
+          </a:p>
+          <a:p>
+            <a:r>
+              <a:rPr lang="en-US" dirty="0" smtClean="0"/>
+              <a:t>Output</a:t>
+            </a:r>
+            <a:r>
+              <a:rPr lang="en-US" dirty="0"/>
+              <a:t>: a rule-based classifier model. </a:t>
+            </a:r>
+          </a:p>
+        </p:txBody>
+      </p:sp>
+      <p:cxnSp>
+        <p:nvCxnSpPr>
+          <p:cNvPr id="10" name="Straight Connector 9"/>
+          <p:cNvCxnSpPr/>
+          <p:nvPr/>
+        </p:nvCxnSpPr>
+        <p:spPr>
+          <a:xfrm>
+            <a:off x="836604" y="2330338"/>
+            <a:ext cx="8350554" cy="0"/>
+          </a:xfrm>
+          <a:prstGeom prst="line">
+            <a:avLst/>
+          </a:prstGeom>
+        </p:spPr>
+        <p:style>
+          <a:lnRef idx="1">
+            <a:schemeClr val="accent1"/>
+          </a:lnRef>
+          <a:fillRef idx="0">
+            <a:schemeClr val="accent1"/>
+          </a:fillRef>
+          <a:effectRef idx="0">
+            <a:schemeClr val="accent1"/>
+          </a:effectRef>
+          <a:fontRef idx="minor">
+            <a:schemeClr val="tx1"/>
+          </a:fontRef>
+        </p:style>
+      </p:cxnSp>
     </p:spTree>
     <p:extLst>
       <p:ext uri="{BB962C8B-B14F-4D97-AF65-F5344CB8AC3E}">
@@ -9561,8 +9816,12 @@
           <a:lstStyle/>
           <a:p>
             <a:r>
-              <a:rPr lang="en-US" dirty="0" smtClean="0"/>
-              <a:t>Algorithm</a:t>
+              <a:rPr lang="en-IN" dirty="0"/>
+              <a:t>Improved Id3 </a:t>
+            </a:r>
+            <a:r>
+              <a:rPr lang="en-IN" dirty="0" smtClean="0"/>
+              <a:t>algorithm</a:t>
             </a:r>
             <a:endParaRPr lang="en-US" dirty="0"/>
           </a:p>
@@ -9586,41 +9845,203 @@
           <a:lstStyle/>
           <a:p>
             <a:pPr>
-              <a:buFont typeface="+mj-lt"/>
-              <a:buAutoNum type="arabicPeriod"/>
+              <a:buAutoNum type="arabicParenR" startAt="9"/>
             </a:pPr>
             <a:r>
               <a:rPr lang="en-US" dirty="0" smtClean="0"/>
-              <a:t>Create </a:t>
+              <a:t>For </a:t>
             </a:r>
             <a:r>
               <a:rPr lang="en-US" dirty="0"/>
-              <a:t>a node M </a:t>
+              <a:t>each value </a:t>
+            </a:r>
+            <a:r>
+              <a:rPr lang="en-US" i="1" dirty="0"/>
+              <a:t>a </a:t>
+            </a:r>
+            <a:r>
+              <a:rPr lang="en-US" i="1" dirty="0" err="1"/>
+              <a:t>i</a:t>
+            </a:r>
+            <a:r>
+              <a:rPr lang="en-US" i="1" dirty="0"/>
+              <a:t> </a:t>
+            </a:r>
+            <a:r>
+              <a:rPr lang="en-US" dirty="0"/>
+              <a:t>of the test attribute (e.g., A) </a:t>
             </a:r>
             <a:endParaRPr lang="en-US" dirty="0" smtClean="0"/>
           </a:p>
           <a:p>
             <a:pPr>
-              <a:buFont typeface="+mj-lt"/>
-              <a:buAutoNum type="arabicPeriod"/>
+              <a:buAutoNum type="arabicParenR" startAt="9"/>
+            </a:pPr>
+            <a:r>
+              <a:rPr lang="en-US" dirty="0" smtClean="0"/>
+              <a:t>Regard </a:t>
+            </a:r>
+            <a:r>
+              <a:rPr lang="en-US" i="1" dirty="0"/>
+              <a:t>A </a:t>
+            </a:r>
+            <a:r>
+              <a:rPr lang="en-US" dirty="0"/>
+              <a:t>= </a:t>
+            </a:r>
+            <a:r>
+              <a:rPr lang="en-US" i="1" dirty="0"/>
+              <a:t>a </a:t>
+            </a:r>
+            <a:r>
+              <a:rPr lang="en-US" i="1" dirty="0" err="1"/>
+              <a:t>i</a:t>
+            </a:r>
+            <a:r>
+              <a:rPr lang="en-US" i="1" dirty="0"/>
+              <a:t> </a:t>
+            </a:r>
+            <a:r>
+              <a:rPr lang="en-US" dirty="0"/>
+              <a:t>as a testing condition and generate a corresponding branch from the node M </a:t>
+            </a:r>
+            <a:endParaRPr lang="en-US" dirty="0"/>
+          </a:p>
+          <a:p>
+            <a:pPr>
+              <a:buAutoNum type="arabicParenR" startAt="9"/>
+            </a:pPr>
+            <a:r>
+              <a:rPr lang="en-US" dirty="0" smtClean="0"/>
+              <a:t>Let </a:t>
+            </a:r>
+            <a:r>
+              <a:rPr lang="en-US" i="1" dirty="0"/>
+              <a:t>S </a:t>
+            </a:r>
+            <a:r>
+              <a:rPr lang="en-US" i="1" dirty="0" err="1"/>
+              <a:t>i</a:t>
+            </a:r>
+            <a:r>
+              <a:rPr lang="en-US" i="1" dirty="0"/>
+              <a:t> </a:t>
+            </a:r>
+            <a:r>
+              <a:rPr lang="en-US" dirty="0"/>
+              <a:t>be the sub-dataset when </a:t>
+            </a:r>
+            <a:r>
+              <a:rPr lang="en-US" i="1" dirty="0"/>
+              <a:t>A </a:t>
+            </a:r>
+            <a:r>
+              <a:rPr lang="en-US" dirty="0"/>
+              <a:t>= </a:t>
+            </a:r>
+            <a:r>
+              <a:rPr lang="en-US" i="1" dirty="0"/>
+              <a:t>a </a:t>
+            </a:r>
+            <a:r>
+              <a:rPr lang="en-US" i="1" dirty="0" err="1"/>
+              <a:t>i</a:t>
+            </a:r>
+            <a:r>
+              <a:rPr lang="en-US" i="1" dirty="0"/>
+              <a:t> </a:t>
+            </a:r>
+            <a:endParaRPr lang="en-US" i="1" dirty="0"/>
+          </a:p>
+          <a:p>
+            <a:pPr>
+              <a:buAutoNum type="arabicParenR" startAt="9"/>
             </a:pPr>
             <a:r>
               <a:rPr lang="en-US" dirty="0" smtClean="0"/>
               <a:t>If </a:t>
             </a:r>
             <a:r>
+              <a:rPr lang="en-US" i="1" dirty="0"/>
+              <a:t>S </a:t>
+            </a:r>
+            <a:r>
+              <a:rPr lang="en-US" i="1" dirty="0" err="1"/>
+              <a:t>i</a:t>
+            </a:r>
+            <a:r>
+              <a:rPr lang="en-US" i="1" dirty="0"/>
+              <a:t> </a:t>
+            </a:r>
+            <a:r>
               <a:rPr lang="en-US" dirty="0"/>
-              <a:t>all instances in a sub-dataset are in the same class (e.g. C), execute (3</a:t>
-            </a:r>
+              <a:t>is empty, then execute (13) </a:t>
+            </a:r>
+            <a:endParaRPr lang="en-US" dirty="0"/>
+          </a:p>
+          <a:p>
+            <a:pPr>
+              <a:buAutoNum type="arabicParenR" startAt="9"/>
+            </a:pPr>
             <a:r>
               <a:rPr lang="en-US" dirty="0" smtClean="0"/>
-              <a:t>)</a:t>
-            </a:r>
+              <a:t>Add </a:t>
+            </a:r>
+            <a:r>
+              <a:rPr lang="en-US" dirty="0"/>
+              <a:t>a leaf node and mark it with the majority class in the dataset </a:t>
+            </a:r>
+            <a:endParaRPr lang="en-US" dirty="0"/>
           </a:p>
           <a:p>
             <a:pPr>
-              <a:buFont typeface="+mj-lt"/>
-              <a:buAutoNum type="arabicPeriod"/>
+              <a:buAutoNum type="arabicParenR" startAt="9"/>
+            </a:pPr>
+            <a:r>
+              <a:rPr lang="en-US" dirty="0" smtClean="0"/>
+              <a:t>Else </a:t>
+            </a:r>
+            <a:r>
+              <a:rPr lang="en-US" dirty="0"/>
+              <a:t>mark it with the return value of </a:t>
+            </a:r>
+            <a:r>
+              <a:rPr lang="en-US" dirty="0" err="1"/>
+              <a:t>Generate_Decision_tree</a:t>
+            </a:r>
+            <a:r>
+              <a:rPr lang="en-US" dirty="0"/>
+              <a:t>( </a:t>
+            </a:r>
+            <a:r>
+              <a:rPr lang="en-US" i="1" dirty="0"/>
+              <a:t>S </a:t>
+            </a:r>
+            <a:r>
+              <a:rPr lang="en-US" i="1" dirty="0" err="1"/>
+              <a:t>i</a:t>
+            </a:r>
+            <a:r>
+              <a:rPr lang="en-US" i="1" dirty="0"/>
+              <a:t> </a:t>
+            </a:r>
+            <a:r>
+              <a:rPr lang="en-US" dirty="0"/>
+              <a:t>, {new attribute list|{attribute list} −</a:t>
+            </a:r>
+            <a:r>
+              <a:rPr lang="en-US" i="1" dirty="0"/>
+              <a:t>A </a:t>
+            </a:r>
+            <a:r>
+              <a:rPr lang="en-US" dirty="0"/>
+              <a:t>}) </a:t>
+            </a:r>
+            <a:endParaRPr lang="en-US" dirty="0"/>
+          </a:p>
+          <a:p>
+            <a:pPr>
+              <a:buAutoNum type="arabicParenR" startAt="9"/>
             </a:pPr>
             <a:r>
               <a:rPr lang="en-US" dirty="0" smtClean="0"/>
@@ -9628,88 +10049,15 @@
             </a:r>
             <a:r>
               <a:rPr lang="en-US" dirty="0"/>
-              <a:t>M as a leaf node and mark it with class C </a:t>
+              <a:t>rule-based decision list. </a:t>
             </a:r>
             <a:endParaRPr lang="en-US" dirty="0" smtClean="0"/>
           </a:p>
           <a:p>
-            <a:pPr>
-              <a:buFont typeface="+mj-lt"/>
-              <a:buAutoNum type="arabicPeriod"/>
+            <a:pPr marL="0" indent="0">
+              <a:buNone/>
             </a:pPr>
-            <a:r>
-              <a:rPr lang="en-US" dirty="0" smtClean="0"/>
-              <a:t>If </a:t>
-            </a:r>
-            <a:r>
-              <a:rPr lang="en-US" dirty="0"/>
-              <a:t>attribute list is empty, then execute (5) </a:t>
-            </a:r>
-            <a:endParaRPr lang="en-US" dirty="0" smtClean="0"/>
-          </a:p>
-          <a:p>
-            <a:pPr>
-              <a:buFont typeface="+mj-lt"/>
-              <a:buAutoNum type="arabicPeriod"/>
-            </a:pPr>
-            <a:r>
-              <a:rPr lang="en-US" dirty="0" smtClean="0"/>
-              <a:t>Return </a:t>
-            </a:r>
-            <a:r>
-              <a:rPr lang="en-US" dirty="0"/>
-              <a:t>M as a leaf node and mark it with the majority class in the dataset </a:t>
-            </a:r>
-            <a:endParaRPr lang="en-US" dirty="0" smtClean="0"/>
-          </a:p>
-          <a:p>
-            <a:pPr>
-              <a:buFont typeface="+mj-lt"/>
-              <a:buAutoNum type="arabicPeriod"/>
-            </a:pPr>
-            <a:r>
-              <a:rPr lang="en-US" dirty="0" smtClean="0"/>
-              <a:t>If </a:t>
-            </a:r>
-            <a:r>
-              <a:rPr lang="en-US" dirty="0"/>
-              <a:t>attribute list is not empty, then select an attribute with the greatest </a:t>
-            </a:r>
-            <a:r>
-              <a:rPr lang="en-US" dirty="0" err="1"/>
-              <a:t>InfoGain</a:t>
-            </a:r>
-            <a:r>
-              <a:rPr lang="en-US" dirty="0"/>
-              <a:t>/f(n) from the attribute list as a test attribute </a:t>
-            </a:r>
-            <a:endParaRPr lang="en-US" dirty="0" smtClean="0"/>
-          </a:p>
-          <a:p>
-            <a:pPr>
-              <a:buFont typeface="+mj-lt"/>
-              <a:buAutoNum type="arabicPeriod"/>
-            </a:pPr>
-            <a:r>
-              <a:rPr lang="en-US" dirty="0" smtClean="0"/>
-              <a:t>Mark </a:t>
-            </a:r>
-            <a:r>
-              <a:rPr lang="en-US" dirty="0"/>
-              <a:t>the node M as the test attribute </a:t>
-            </a:r>
-            <a:endParaRPr lang="en-US" dirty="0" smtClean="0"/>
-          </a:p>
-          <a:p>
-            <a:pPr>
-              <a:buFont typeface="+mj-lt"/>
-              <a:buAutoNum type="arabicPeriod"/>
-            </a:pPr>
-            <a:r>
-              <a:rPr lang="en-US" dirty="0"/>
-              <a:t>(8) If it is a numeric attribute, discretize it based on the class attribute values; Then execute (9) </a:t>
-            </a:r>
-            <a:endParaRPr lang="en-US" dirty="0" smtClean="0"/>
+            <a:endParaRPr lang="en-US" dirty="0"/>
           </a:p>
         </p:txBody>
       </p:sp>
@@ -9730,7 +10078,7 @@
           <a:p>
             <a:fld id="{394D53E8-1B8B-4755-93F2-632F5DEDB722}" type="datetime1">
               <a:rPr lang="en-US" smtClean="0"/>
-              <a:t>14-Aug-18</a:t>
+              <a:t>8/15/2018</a:t>
             </a:fld>
             <a:endParaRPr lang="en-US"/>
           </a:p>
@@ -9829,7 +10177,7 @@
           <a:p>
             <a:r>
               <a:rPr lang="en-US" dirty="0" smtClean="0"/>
-              <a:t>Algorithm</a:t>
+              <a:t>Rule representation of classifier model</a:t>
             </a:r>
             <a:endParaRPr lang="en-US" dirty="0"/>
           </a:p>
@@ -9853,207 +10201,26 @@
           <a:lstStyle/>
           <a:p>
             <a:r>
+              <a:rPr lang="en-US" dirty="0" err="1" smtClean="0"/>
+              <a:t>TransformTreeToRules</a:t>
+            </a:r>
+            <a:r>
               <a:rPr lang="en-US" dirty="0" smtClean="0"/>
-              <a:t>(9) For </a:t>
-            </a:r>
-            <a:r>
-              <a:rPr lang="en-US" dirty="0"/>
-              <a:t>each value </a:t>
-            </a:r>
-            <a:r>
-              <a:rPr lang="en-US" i="1" dirty="0"/>
-              <a:t>a </a:t>
-            </a:r>
-            <a:r>
-              <a:rPr lang="en-US" i="1" dirty="0" err="1"/>
-              <a:t>i</a:t>
-            </a:r>
-            <a:r>
-              <a:rPr lang="en-US" i="1" dirty="0"/>
-              <a:t> </a:t>
-            </a:r>
-            <a:r>
-              <a:rPr lang="en-US" dirty="0"/>
-              <a:t>of the test attribute (e.g., A) </a:t>
-            </a:r>
-            <a:endParaRPr lang="en-US" dirty="0" smtClean="0"/>
-          </a:p>
-          <a:p>
+              <a:t> approach generates rule-based classifier models </a:t>
+            </a:r>
+          </a:p>
+          <a:p>
+            <a:pPr lvl="1"/>
             <a:r>
               <a:rPr lang="en-US" dirty="0" smtClean="0"/>
-              <a:t>(</a:t>
-            </a:r>
-            <a:r>
-              <a:rPr lang="en-US" dirty="0"/>
-              <a:t>10) Regard </a:t>
-            </a:r>
-            <a:r>
-              <a:rPr lang="en-US" i="1" dirty="0"/>
-              <a:t>A </a:t>
-            </a:r>
-            <a:r>
-              <a:rPr lang="en-US" dirty="0"/>
-              <a:t>= </a:t>
-            </a:r>
-            <a:r>
-              <a:rPr lang="en-US" i="1" dirty="0"/>
-              <a:t>a </a:t>
-            </a:r>
-            <a:r>
-              <a:rPr lang="en-US" i="1" dirty="0" err="1"/>
-              <a:t>i</a:t>
-            </a:r>
-            <a:r>
-              <a:rPr lang="en-US" i="1" dirty="0"/>
-              <a:t> </a:t>
-            </a:r>
-            <a:r>
-              <a:rPr lang="en-US" dirty="0"/>
-              <a:t>as a testing condition and generate a corresponding branch from the node M </a:t>
-            </a:r>
-            <a:endParaRPr lang="en-US" dirty="0" smtClean="0"/>
+              <a:t>representing rules as “IF...THEN ... ”.</a:t>
+            </a:r>
           </a:p>
           <a:p>
             <a:r>
               <a:rPr lang="en-US" dirty="0" smtClean="0"/>
-              <a:t>(</a:t>
-            </a:r>
-            <a:r>
-              <a:rPr lang="en-US" dirty="0"/>
-              <a:t>11) Let </a:t>
-            </a:r>
-            <a:r>
-              <a:rPr lang="en-US" i="1" dirty="0"/>
-              <a:t>S </a:t>
-            </a:r>
-            <a:r>
-              <a:rPr lang="en-US" i="1" dirty="0" err="1"/>
-              <a:t>i</a:t>
-            </a:r>
-            <a:r>
-              <a:rPr lang="en-US" i="1" dirty="0"/>
-              <a:t> </a:t>
-            </a:r>
-            <a:r>
-              <a:rPr lang="en-US" dirty="0"/>
-              <a:t>be the sub-dataset when </a:t>
-            </a:r>
-            <a:r>
-              <a:rPr lang="en-US" i="1" dirty="0"/>
-              <a:t>A </a:t>
-            </a:r>
-            <a:r>
-              <a:rPr lang="en-US" dirty="0"/>
-              <a:t>= </a:t>
-            </a:r>
-            <a:r>
-              <a:rPr lang="en-US" i="1" dirty="0"/>
-              <a:t>a </a:t>
-            </a:r>
-            <a:r>
-              <a:rPr lang="en-US" i="1" dirty="0" err="1"/>
-              <a:t>i</a:t>
-            </a:r>
-            <a:r>
-              <a:rPr lang="en-US" i="1" dirty="0"/>
-              <a:t> </a:t>
-            </a:r>
-            <a:endParaRPr lang="en-US" i="1" dirty="0" smtClean="0"/>
-          </a:p>
-          <a:p>
-            <a:r>
-              <a:rPr lang="en-US" dirty="0" smtClean="0"/>
-              <a:t>(</a:t>
-            </a:r>
-            <a:r>
-              <a:rPr lang="en-US" dirty="0"/>
-              <a:t>12) If </a:t>
-            </a:r>
-            <a:r>
-              <a:rPr lang="en-US" i="1" dirty="0"/>
-              <a:t>S </a:t>
-            </a:r>
-            <a:r>
-              <a:rPr lang="en-US" i="1" dirty="0" err="1"/>
-              <a:t>i</a:t>
-            </a:r>
-            <a:r>
-              <a:rPr lang="en-US" i="1" dirty="0"/>
-              <a:t> </a:t>
-            </a:r>
-            <a:r>
-              <a:rPr lang="en-US" dirty="0"/>
-              <a:t>is empty, then execute (13) </a:t>
-            </a:r>
-            <a:endParaRPr lang="en-US" dirty="0" smtClean="0"/>
-          </a:p>
-          <a:p>
-            <a:r>
-              <a:rPr lang="en-US" dirty="0" smtClean="0"/>
-              <a:t>(</a:t>
-            </a:r>
-            <a:r>
-              <a:rPr lang="en-US" dirty="0"/>
-              <a:t>13) Add a leaf node and mark it with the majority class in the dataset </a:t>
-            </a:r>
-            <a:endParaRPr lang="en-US" dirty="0" smtClean="0"/>
-          </a:p>
-          <a:p>
-            <a:r>
-              <a:rPr lang="en-US" dirty="0" smtClean="0"/>
-              <a:t>(</a:t>
-            </a:r>
-            <a:r>
-              <a:rPr lang="en-US" dirty="0"/>
-              <a:t>14) Else mark it with the return value of </a:t>
-            </a:r>
-            <a:r>
-              <a:rPr lang="en-US" dirty="0" err="1"/>
-              <a:t>Generate_Decision_tree</a:t>
-            </a:r>
-            <a:r>
-              <a:rPr lang="en-US" dirty="0"/>
-              <a:t>( </a:t>
-            </a:r>
-            <a:r>
-              <a:rPr lang="en-US" i="1" dirty="0"/>
-              <a:t>S </a:t>
-            </a:r>
-            <a:r>
-              <a:rPr lang="en-US" i="1" dirty="0" err="1"/>
-              <a:t>i</a:t>
-            </a:r>
-            <a:r>
-              <a:rPr lang="en-US" i="1" dirty="0"/>
-              <a:t> </a:t>
-            </a:r>
-            <a:r>
-              <a:rPr lang="en-US" dirty="0"/>
-              <a:t>, {new attribute list|{attribute list} −</a:t>
-            </a:r>
-            <a:r>
-              <a:rPr lang="en-US" i="1" dirty="0"/>
-              <a:t>A </a:t>
-            </a:r>
-            <a:r>
-              <a:rPr lang="en-US" dirty="0"/>
-              <a:t>}) </a:t>
-            </a:r>
-            <a:endParaRPr lang="en-US" dirty="0" smtClean="0"/>
-          </a:p>
-          <a:p>
-            <a:r>
-              <a:rPr lang="en-US" dirty="0" smtClean="0"/>
-              <a:t>(</a:t>
-            </a:r>
-            <a:r>
-              <a:rPr lang="en-US" dirty="0"/>
-              <a:t>15) Return rule-based decision list. </a:t>
-            </a:r>
-            <a:endParaRPr lang="en-US" dirty="0" smtClean="0"/>
-          </a:p>
-          <a:p>
-            <a:endParaRPr lang="en-US" dirty="0"/>
+              <a:t>Conjunction of all attribute-value pairs in the path constructs the IF part of the rule, while the class label in a leaf is the THEN part</a:t>
+            </a:r>
           </a:p>
         </p:txBody>
       </p:sp>
@@ -10074,7 +10241,7 @@
           <a:p>
             <a:fld id="{394D53E8-1B8B-4755-93F2-632F5DEDB722}" type="datetime1">
               <a:rPr lang="en-US" smtClean="0"/>
-              <a:t>14-Aug-18</a:t>
+              <a:t>8/15/2018</a:t>
             </a:fld>
             <a:endParaRPr lang="en-US"/>
           </a:p>
@@ -10129,13 +10296,20 @@
     </p:spTree>
     <p:extLst>
       <p:ext uri="{BB962C8B-B14F-4D97-AF65-F5344CB8AC3E}">
-        <p14:creationId xmlns:p14="http://schemas.microsoft.com/office/powerpoint/2010/main" val="33786111"/>
+        <p14:creationId xmlns:p14="http://schemas.microsoft.com/office/powerpoint/2010/main" val="3664754908"/>
       </p:ext>
     </p:extLst>
   </p:cSld>
   <p:clrMapOvr>
     <a:masterClrMapping/>
   </p:clrMapOvr>
+  <p:timing>
+    <p:tnLst>
+      <p:par>
+        <p:cTn id="1" dur="indefinite" restart="never" nodeType="tmRoot"/>
+      </p:par>
+    </p:tnLst>
+  </p:timing>
 </p:sld>
 </file>
 
@@ -10172,10 +10346,9 @@
           <a:lstStyle/>
           <a:p>
             <a:r>
-              <a:rPr lang="en-US" dirty="0" smtClean="0"/>
-              <a:t>Rule representation of classifier model</a:t>
-            </a:r>
-            <a:endParaRPr lang="en-US" dirty="0"/>
+              <a:rPr lang="en-US" dirty="0"/>
+              <a:t>Heuristic strategy</a:t>
+            </a:r>
           </a:p>
         </p:txBody>
       </p:sp>
@@ -10197,26 +10370,149 @@
           <a:lstStyle/>
           <a:p>
             <a:r>
-              <a:rPr lang="en-US" dirty="0" err="1" smtClean="0"/>
-              <a:t>TransformTreeToRules</a:t>
+              <a:rPr lang="en-US" dirty="0"/>
+              <a:t>Heuristic strategy of four steps for rule pruning are used to shrink the size of the </a:t>
+            </a:r>
+            <a:r>
+              <a:rPr lang="en-US" dirty="0" err="1"/>
+              <a:t>rulebase</a:t>
+            </a:r>
+            <a:r>
+              <a:rPr lang="en-US" dirty="0"/>
+              <a:t>:  </a:t>
+            </a:r>
+          </a:p>
+          <a:p>
+            <a:pPr lvl="1"/>
+            <a:r>
+              <a:rPr lang="en-US" b="1" dirty="0"/>
+              <a:t>Step 1 </a:t>
+            </a:r>
+            <a:r>
+              <a:rPr lang="en-US" dirty="0"/>
+              <a:t>: Supplement each rule with irrelevant </a:t>
             </a:r>
             <a:r>
               <a:rPr lang="en-US" dirty="0" smtClean="0"/>
-              <a:t> approach generates rule-based classifier models </a:t>
-            </a:r>
+              <a:t>values. Irrelevant </a:t>
+            </a:r>
+            <a:r>
+              <a:rPr lang="en-US" dirty="0"/>
+              <a:t>values are the values of irrelevant attributes which can be deleted or replaced by any values from the same domain values without affecting the correctness of the rule.  </a:t>
+            </a:r>
+            <a:endParaRPr lang="en-US" dirty="0" smtClean="0"/>
           </a:p>
           <a:p>
             <a:pPr lvl="1"/>
             <a:r>
-              <a:rPr lang="en-US" dirty="0" smtClean="0"/>
-              <a:t>representing rules as “IF...THEN ... ”.</a:t>
-            </a:r>
-          </a:p>
-          <a:p>
-            <a:r>
-              <a:rPr lang="en-US" dirty="0" smtClean="0"/>
-              <a:t>Conjunction of all attribute-value pairs in the path constructs the IF part of the rule, while the class label in a leaf is the THEN part</a:t>
-            </a:r>
+              <a:rPr lang="en-US" b="1" dirty="0"/>
+              <a:t>Step 2 </a:t>
+            </a:r>
+            <a:r>
+              <a:rPr lang="en-US" dirty="0"/>
+              <a:t>: If a rule ( </a:t>
+            </a:r>
+            <a:r>
+              <a:rPr lang="en-US" i="1" dirty="0" err="1"/>
+              <a:t>e.g</a:t>
+            </a:r>
+            <a:r>
+              <a:rPr lang="en-US" i="1" dirty="0"/>
+              <a:t> </a:t>
+            </a:r>
+            <a:r>
+              <a:rPr lang="en-US" dirty="0"/>
+              <a:t>., </a:t>
+            </a:r>
+            <a:r>
+              <a:rPr lang="en-US" i="1" dirty="0"/>
+              <a:t>r</a:t>
+            </a:r>
+            <a:r>
+              <a:rPr lang="en-US" baseline="-25000" dirty="0"/>
+              <a:t>1</a:t>
+            </a:r>
+            <a:r>
+              <a:rPr lang="en-US" dirty="0"/>
+              <a:t> ) has </a:t>
+            </a:r>
+            <a:r>
+              <a:rPr lang="en-US" i="1" dirty="0"/>
+              <a:t>n </a:t>
+            </a:r>
+            <a:r>
+              <a:rPr lang="en-US" dirty="0"/>
+              <a:t>conditions in the head part and the former </a:t>
+            </a:r>
+            <a:r>
+              <a:rPr lang="en-US" i="1" dirty="0" err="1"/>
+              <a:t>i</a:t>
+            </a:r>
+            <a:r>
+              <a:rPr lang="en-US" i="1" dirty="0"/>
+              <a:t> </a:t>
+            </a:r>
+            <a:r>
+              <a:rPr lang="en-US" dirty="0"/>
+              <a:t>conditions are different from other rules, then the latter (</a:t>
+            </a:r>
+            <a:r>
+              <a:rPr lang="en-US" i="1" dirty="0"/>
+              <a:t>n</a:t>
+            </a:r>
+            <a:r>
+              <a:rPr lang="en-US" dirty="0"/>
+              <a:t>−</a:t>
+            </a:r>
+            <a:r>
+              <a:rPr lang="en-US" i="1" dirty="0"/>
+              <a:t>i</a:t>
+            </a:r>
+            <a:r>
+              <a:rPr lang="en-US" dirty="0"/>
+              <a:t>+1) conditions can be deleted from </a:t>
+            </a:r>
+            <a:r>
+              <a:rPr lang="en-US" i="1" dirty="0"/>
+              <a:t>r</a:t>
+            </a:r>
+            <a:r>
+              <a:rPr lang="en-US" baseline="-25000" dirty="0"/>
+              <a:t>1</a:t>
+            </a:r>
+            <a:r>
+              <a:rPr lang="en-US" dirty="0"/>
+              <a:t>.</a:t>
+            </a:r>
+          </a:p>
+          <a:p>
+            <a:pPr lvl="1"/>
+            <a:r>
+              <a:rPr lang="en-US" b="1" dirty="0"/>
+              <a:t>Step 3 </a:t>
+            </a:r>
+            <a:r>
+              <a:rPr lang="en-US" dirty="0"/>
+              <a:t>: All rules are assigned to different groups in a decedent order according to the number of same conditions in the head part. </a:t>
+            </a:r>
+          </a:p>
+          <a:p>
+            <a:pPr lvl="1"/>
+            <a:r>
+              <a:rPr lang="en-US" b="1" dirty="0"/>
+              <a:t>Step 4 </a:t>
+            </a:r>
+            <a:r>
+              <a:rPr lang="en-US" dirty="0"/>
+              <a:t>: The set of rules is further reduced based on the MDL principle finding the shortest description of rules of the same group by dropping repeated conditions in their head parts. </a:t>
+            </a:r>
+          </a:p>
+          <a:p>
+            <a:pPr lvl="1"/>
+            <a:endParaRPr lang="en-US" dirty="0"/>
+          </a:p>
+          <a:p>
+            <a:endParaRPr lang="en-US" dirty="0"/>
           </a:p>
         </p:txBody>
       </p:sp>
@@ -10237,7 +10533,7 @@
           <a:p>
             <a:fld id="{394D53E8-1B8B-4755-93F2-632F5DEDB722}" type="datetime1">
               <a:rPr lang="en-US" smtClean="0"/>
-              <a:t>14-Aug-18</a:t>
+              <a:t>8/15/2018</a:t>
             </a:fld>
             <a:endParaRPr lang="en-US"/>
           </a:p>
@@ -10284,298 +10580,6 @@
             <a:fld id="{163CD270-FDF0-4541-94DA-1D5672B9A707}" type="slidenum">
               <a:rPr lang="en-US" smtClean="0"/>
               <a:t>17</a:t>
-            </a:fld>
-            <a:endParaRPr lang="en-US"/>
-          </a:p>
-        </p:txBody>
-      </p:sp>
-    </p:spTree>
-    <p:extLst>
-      <p:ext uri="{BB962C8B-B14F-4D97-AF65-F5344CB8AC3E}">
-        <p14:creationId xmlns:p14="http://schemas.microsoft.com/office/powerpoint/2010/main" val="3664754908"/>
-      </p:ext>
-    </p:extLst>
-  </p:cSld>
-  <p:clrMapOvr>
-    <a:masterClrMapping/>
-  </p:clrMapOvr>
-  <p:timing>
-    <p:tnLst>
-      <p:par>
-        <p:cTn id="1" dur="indefinite" restart="never" nodeType="tmRoot"/>
-      </p:par>
-    </p:tnLst>
-  </p:timing>
-</p:sld>
-</file>
-
-<file path=ppt/slides/slide18.xml><?xml version="1.0" encoding="utf-8"?>
-<p:sld xmlns:a="http://schemas.openxmlformats.org/drawingml/2006/main" xmlns:r="http://schemas.openxmlformats.org/officeDocument/2006/relationships" xmlns:p="http://schemas.openxmlformats.org/presentationml/2006/main">
-  <p:cSld>
-    <p:spTree>
-      <p:nvGrpSpPr>
-        <p:cNvPr id="1" name=""/>
-        <p:cNvGrpSpPr/>
-        <p:nvPr/>
-      </p:nvGrpSpPr>
-      <p:grpSpPr>
-        <a:xfrm>
-          <a:off x="0" y="0"/>
-          <a:ext cx="0" cy="0"/>
-          <a:chOff x="0" y="0"/>
-          <a:chExt cx="0" cy="0"/>
-        </a:xfrm>
-      </p:grpSpPr>
-      <p:sp>
-        <p:nvSpPr>
-          <p:cNvPr id="2" name="Title 1"/>
-          <p:cNvSpPr>
-            <a:spLocks noGrp="1"/>
-          </p:cNvSpPr>
-          <p:nvPr>
-            <p:ph type="title"/>
-          </p:nvPr>
-        </p:nvSpPr>
-        <p:spPr/>
-        <p:txBody>
-          <a:bodyPr/>
-          <a:lstStyle/>
-          <a:p>
-            <a:r>
-              <a:rPr lang="en-US" dirty="0"/>
-              <a:t>Heuristic strategy</a:t>
-            </a:r>
-          </a:p>
-        </p:txBody>
-      </p:sp>
-      <p:sp>
-        <p:nvSpPr>
-          <p:cNvPr id="3" name="Content Placeholder 2"/>
-          <p:cNvSpPr>
-            <a:spLocks noGrp="1"/>
-          </p:cNvSpPr>
-          <p:nvPr>
-            <p:ph idx="1"/>
-          </p:nvPr>
-        </p:nvSpPr>
-        <p:spPr/>
-        <p:txBody>
-          <a:bodyPr>
-            <a:normAutofit/>
-          </a:bodyPr>
-          <a:lstStyle/>
-          <a:p>
-            <a:r>
-              <a:rPr lang="en-US" dirty="0"/>
-              <a:t>Heuristic strategy of four steps for rule pruning are used to shrink the size of the </a:t>
-            </a:r>
-            <a:r>
-              <a:rPr lang="en-US" dirty="0" err="1"/>
-              <a:t>rulebase</a:t>
-            </a:r>
-            <a:r>
-              <a:rPr lang="en-US" dirty="0"/>
-              <a:t>:  </a:t>
-            </a:r>
-          </a:p>
-          <a:p>
-            <a:pPr lvl="1"/>
-            <a:r>
-              <a:rPr lang="en-US" b="1" dirty="0"/>
-              <a:t>Step 1 </a:t>
-            </a:r>
-            <a:r>
-              <a:rPr lang="en-US" dirty="0"/>
-              <a:t>: Supplement each rule with irrelevant </a:t>
-            </a:r>
-            <a:r>
-              <a:rPr lang="en-US" dirty="0" smtClean="0"/>
-              <a:t>values. Irrelevant </a:t>
-            </a:r>
-            <a:r>
-              <a:rPr lang="en-US" dirty="0"/>
-              <a:t>values are the values of irrelevant attributes which can be deleted or replaced by any values from the same domain values without affecting the correctness of the rule.  </a:t>
-            </a:r>
-            <a:endParaRPr lang="en-US" dirty="0" smtClean="0"/>
-          </a:p>
-          <a:p>
-            <a:pPr lvl="1"/>
-            <a:r>
-              <a:rPr lang="en-US" b="1" dirty="0"/>
-              <a:t>Step 2 </a:t>
-            </a:r>
-            <a:r>
-              <a:rPr lang="en-US" dirty="0"/>
-              <a:t>: If a rule ( </a:t>
-            </a:r>
-            <a:r>
-              <a:rPr lang="en-US" i="1" dirty="0" err="1"/>
-              <a:t>e.g</a:t>
-            </a:r>
-            <a:r>
-              <a:rPr lang="en-US" i="1" dirty="0"/>
-              <a:t> </a:t>
-            </a:r>
-            <a:r>
-              <a:rPr lang="en-US" dirty="0"/>
-              <a:t>., </a:t>
-            </a:r>
-            <a:r>
-              <a:rPr lang="en-US" i="1" dirty="0"/>
-              <a:t>r</a:t>
-            </a:r>
-            <a:r>
-              <a:rPr lang="en-US" baseline="-25000" dirty="0"/>
-              <a:t>1</a:t>
-            </a:r>
-            <a:r>
-              <a:rPr lang="en-US" dirty="0"/>
-              <a:t> ) has </a:t>
-            </a:r>
-            <a:r>
-              <a:rPr lang="en-US" i="1" dirty="0"/>
-              <a:t>n </a:t>
-            </a:r>
-            <a:r>
-              <a:rPr lang="en-US" dirty="0"/>
-              <a:t>conditions in the head part and the former </a:t>
-            </a:r>
-            <a:r>
-              <a:rPr lang="en-US" i="1" dirty="0" err="1"/>
-              <a:t>i</a:t>
-            </a:r>
-            <a:r>
-              <a:rPr lang="en-US" i="1" dirty="0"/>
-              <a:t> </a:t>
-            </a:r>
-            <a:r>
-              <a:rPr lang="en-US" dirty="0"/>
-              <a:t>conditions are different from other rules, then the latter (</a:t>
-            </a:r>
-            <a:r>
-              <a:rPr lang="en-US" i="1" dirty="0"/>
-              <a:t>n</a:t>
-            </a:r>
-            <a:r>
-              <a:rPr lang="en-US" dirty="0"/>
-              <a:t>−</a:t>
-            </a:r>
-            <a:r>
-              <a:rPr lang="en-US" i="1" dirty="0"/>
-              <a:t>i</a:t>
-            </a:r>
-            <a:r>
-              <a:rPr lang="en-US" dirty="0"/>
-              <a:t>+1) conditions can be deleted from </a:t>
-            </a:r>
-            <a:r>
-              <a:rPr lang="en-US" i="1" dirty="0"/>
-              <a:t>r</a:t>
-            </a:r>
-            <a:r>
-              <a:rPr lang="en-US" baseline="-25000" dirty="0"/>
-              <a:t>1</a:t>
-            </a:r>
-            <a:r>
-              <a:rPr lang="en-US" dirty="0"/>
-              <a:t>.</a:t>
-            </a:r>
-          </a:p>
-          <a:p>
-            <a:pPr lvl="1"/>
-            <a:r>
-              <a:rPr lang="en-US" b="1" dirty="0"/>
-              <a:t>Step 3 </a:t>
-            </a:r>
-            <a:r>
-              <a:rPr lang="en-US" dirty="0"/>
-              <a:t>: All rules are assigned to different groups in a decedent order according to the number of same conditions in the head part. </a:t>
-            </a:r>
-          </a:p>
-          <a:p>
-            <a:pPr lvl="1"/>
-            <a:r>
-              <a:rPr lang="en-US" b="1" dirty="0"/>
-              <a:t>Step 4 </a:t>
-            </a:r>
-            <a:r>
-              <a:rPr lang="en-US" dirty="0"/>
-              <a:t>: The set of rules is further reduced based on the MDL principle finding the shortest description of rules of the same group by dropping repeated conditions in their head parts. </a:t>
-            </a:r>
-          </a:p>
-          <a:p>
-            <a:pPr lvl="1"/>
-            <a:endParaRPr lang="en-US" dirty="0"/>
-          </a:p>
-          <a:p>
-            <a:endParaRPr lang="en-US" dirty="0"/>
-          </a:p>
-        </p:txBody>
-      </p:sp>
-      <p:sp>
-        <p:nvSpPr>
-          <p:cNvPr id="4" name="Date Placeholder 3"/>
-          <p:cNvSpPr>
-            <a:spLocks noGrp="1"/>
-          </p:cNvSpPr>
-          <p:nvPr>
-            <p:ph type="dt" sz="half" idx="10"/>
-          </p:nvPr>
-        </p:nvSpPr>
-        <p:spPr/>
-        <p:txBody>
-          <a:bodyPr/>
-          <a:lstStyle/>
-          <a:p>
-            <a:fld id="{394D53E8-1B8B-4755-93F2-632F5DEDB722}" type="datetime1">
-              <a:rPr lang="en-US" smtClean="0"/>
-              <a:t>14-Aug-18</a:t>
-            </a:fld>
-            <a:endParaRPr lang="en-US"/>
-          </a:p>
-        </p:txBody>
-      </p:sp>
-      <p:sp>
-        <p:nvSpPr>
-          <p:cNvPr id="5" name="Footer Placeholder 4"/>
-          <p:cNvSpPr>
-            <a:spLocks noGrp="1"/>
-          </p:cNvSpPr>
-          <p:nvPr>
-            <p:ph type="ftr" sz="quarter" idx="11"/>
-          </p:nvPr>
-        </p:nvSpPr>
-        <p:spPr/>
-        <p:txBody>
-          <a:bodyPr/>
-          <a:lstStyle/>
-          <a:p>
-            <a:r>
-              <a:rPr lang="en-US" smtClean="0"/>
-              <a:t>N.L.Veerendra,K.Gangadhar,P.R.Surya</a:t>
-            </a:r>
-            <a:endParaRPr lang="en-US"/>
-          </a:p>
-        </p:txBody>
-      </p:sp>
-      <p:sp>
-        <p:nvSpPr>
-          <p:cNvPr id="6" name="Slide Number Placeholder 5"/>
-          <p:cNvSpPr>
-            <a:spLocks noGrp="1"/>
-          </p:cNvSpPr>
-          <p:nvPr>
-            <p:ph type="sldNum" sz="quarter" idx="12"/>
-          </p:nvPr>
-        </p:nvSpPr>
-        <p:spPr/>
-        <p:txBody>
-          <a:bodyPr/>
-          <a:lstStyle/>
-          <a:p>
-            <a:fld id="{163CD270-FDF0-4541-94DA-1D5672B9A707}" type="slidenum">
-              <a:rPr lang="en-US" smtClean="0"/>
-              <a:t>18</a:t>
             </a:fld>
             <a:endParaRPr lang="en-US"/>
           </a:p>
@@ -10733,7 +10737,7 @@
           <a:p>
             <a:fld id="{DF43A106-7D37-4ABC-94A1-8DF6566DD7F5}" type="datetime1">
               <a:rPr lang="en-US" smtClean="0"/>
-              <a:t>14-Aug-18</a:t>
+              <a:t>8/15/2018</a:t>
             </a:fld>
             <a:endParaRPr lang="en-US"/>
           </a:p>
@@ -10943,7 +10947,7 @@
           <a:p>
             <a:fld id="{394D53E8-1B8B-4755-93F2-632F5DEDB722}" type="datetime1">
               <a:rPr lang="en-US" smtClean="0"/>
-              <a:t>14-Aug-18</a:t>
+              <a:t>8/15/2018</a:t>
             </a:fld>
             <a:endParaRPr lang="en-US"/>
           </a:p>
@@ -11362,7 +11366,7 @@
           <a:p>
             <a:fld id="{394D53E8-1B8B-4755-93F2-632F5DEDB722}" type="datetime1">
               <a:rPr lang="en-US" smtClean="0"/>
-              <a:t>14-Aug-18</a:t>
+              <a:t>8/15/2018</a:t>
             </a:fld>
             <a:endParaRPr lang="en-US"/>
           </a:p>
@@ -11474,8 +11478,8 @@
           </a:p>
         </p:txBody>
       </p:sp>
-      <mc:AlternateContent xmlns:mc="http://schemas.openxmlformats.org/markup-compatibility/2006">
-        <mc:Choice xmlns:a14="http://schemas.microsoft.com/office/drawing/2010/main" Requires="a14">
+      <mc:AlternateContent xmlns:mc="http://schemas.openxmlformats.org/markup-compatibility/2006" xmlns:a14="http://schemas.microsoft.com/office/drawing/2010/main">
+        <mc:Choice Requires="a14">
           <p:sp>
             <p:nvSpPr>
               <p:cNvPr id="3" name="Content Placeholder 2"/>
@@ -11844,7 +11848,7 @@
             </p:txBody>
           </p:sp>
         </mc:Choice>
-        <mc:Fallback>
+        <mc:Fallback xmlns="">
           <p:sp>
             <p:nvSpPr>
               <p:cNvPr id="3" name="Content Placeholder 2"/>
@@ -11895,7 +11899,7 @@
           <a:p>
             <a:fld id="{394D53E8-1B8B-4755-93F2-632F5DEDB722}" type="datetime1">
               <a:rPr lang="en-US" smtClean="0"/>
-              <a:t>14-Aug-18</a:t>
+              <a:t>8/15/2018</a:t>
             </a:fld>
             <a:endParaRPr lang="en-US"/>
           </a:p>
@@ -12095,7 +12099,7 @@
           <a:p>
             <a:fld id="{394D53E8-1B8B-4755-93F2-632F5DEDB722}" type="datetime1">
               <a:rPr lang="en-US" smtClean="0"/>
-              <a:t>14-Aug-18</a:t>
+              <a:t>8/15/2018</a:t>
             </a:fld>
             <a:endParaRPr lang="en-US"/>
           </a:p>
@@ -12279,7 +12283,7 @@
           <a:p>
             <a:fld id="{394D53E8-1B8B-4755-93F2-632F5DEDB722}" type="datetime1">
               <a:rPr lang="en-US" smtClean="0"/>
-              <a:t>14-Aug-18</a:t>
+              <a:t>8/15/2018</a:t>
             </a:fld>
             <a:endParaRPr lang="en-US"/>
           </a:p>
@@ -12445,7 +12449,7 @@
           <a:p>
             <a:fld id="{394D53E8-1B8B-4755-93F2-632F5DEDB722}" type="datetime1">
               <a:rPr lang="en-US" smtClean="0"/>
-              <a:t>14-Aug-18</a:t>
+              <a:t>8/15/2018</a:t>
             </a:fld>
             <a:endParaRPr lang="en-US"/>
           </a:p>
@@ -12557,8 +12561,8 @@
           </a:p>
         </p:txBody>
       </p:sp>
-      <mc:AlternateContent xmlns:mc="http://schemas.openxmlformats.org/markup-compatibility/2006">
-        <mc:Choice xmlns:a14="http://schemas.microsoft.com/office/drawing/2010/main" Requires="a14">
+      <mc:AlternateContent xmlns:mc="http://schemas.openxmlformats.org/markup-compatibility/2006" xmlns:a14="http://schemas.microsoft.com/office/drawing/2010/main">
+        <mc:Choice Requires="a14">
           <p:sp>
             <p:nvSpPr>
               <p:cNvPr id="3" name="Content Placeholder 2"/>
@@ -12852,7 +12856,7 @@
             </p:txBody>
           </p:sp>
         </mc:Choice>
-        <mc:Fallback>
+        <mc:Fallback xmlns="">
           <p:sp>
             <p:nvSpPr>
               <p:cNvPr id="3" name="Content Placeholder 2"/>
@@ -12903,7 +12907,7 @@
           <a:p>
             <a:fld id="{394D53E8-1B8B-4755-93F2-632F5DEDB722}" type="datetime1">
               <a:rPr lang="en-US" smtClean="0"/>
-              <a:t>14-Aug-18</a:t>
+              <a:t>8/15/2018</a:t>
             </a:fld>
             <a:endParaRPr lang="en-US"/>
           </a:p>

</xml_diff>

<commit_message>
corrected numbering in algoritms of ppt.
</commit_message>
<xml_diff>
--- a/Presentation/An improved Id3 algorithm for clinical data classification.pptx
+++ b/Presentation/An improved Id3 algorithm for clinical data classification.pptx
@@ -9420,7 +9420,7 @@
           <a:p>
             <a:pPr>
               <a:buFont typeface="+mj-lt"/>
-              <a:buAutoNum type="arabicPeriod"/>
+              <a:buAutoNum type="arabicParenR"/>
             </a:pPr>
             <a:r>
               <a:rPr lang="en-US" dirty="0" smtClean="0"/>
@@ -9435,7 +9435,7 @@
           <a:p>
             <a:pPr>
               <a:buFont typeface="+mj-lt"/>
-              <a:buAutoNum type="arabicPeriod"/>
+              <a:buAutoNum type="arabicParenR"/>
             </a:pPr>
             <a:r>
               <a:rPr lang="en-US" dirty="0" smtClean="0"/>
@@ -9453,7 +9453,7 @@
           <a:p>
             <a:pPr>
               <a:buFont typeface="+mj-lt"/>
-              <a:buAutoNum type="arabicPeriod"/>
+              <a:buAutoNum type="arabicParenR"/>
             </a:pPr>
             <a:r>
               <a:rPr lang="en-US" dirty="0" smtClean="0"/>
@@ -9468,7 +9468,7 @@
           <a:p>
             <a:pPr>
               <a:buFont typeface="+mj-lt"/>
-              <a:buAutoNum type="arabicPeriod"/>
+              <a:buAutoNum type="arabicParenR"/>
             </a:pPr>
             <a:r>
               <a:rPr lang="en-US" dirty="0" smtClean="0"/>
@@ -9483,7 +9483,7 @@
           <a:p>
             <a:pPr>
               <a:buFont typeface="+mj-lt"/>
-              <a:buAutoNum type="arabicPeriod"/>
+              <a:buAutoNum type="arabicParenR"/>
             </a:pPr>
             <a:r>
               <a:rPr lang="en-US" dirty="0" smtClean="0"/>
@@ -9498,7 +9498,7 @@
           <a:p>
             <a:pPr>
               <a:buFont typeface="+mj-lt"/>
-              <a:buAutoNum type="arabicPeriod"/>
+              <a:buAutoNum type="arabicParenR"/>
             </a:pPr>
             <a:r>
               <a:rPr lang="en-US" dirty="0" smtClean="0"/>
@@ -9521,7 +9521,7 @@
           <a:p>
             <a:pPr>
               <a:buFont typeface="+mj-lt"/>
-              <a:buAutoNum type="arabicPeriod"/>
+              <a:buAutoNum type="arabicParenR"/>
             </a:pPr>
             <a:r>
               <a:rPr lang="en-US" dirty="0" smtClean="0"/>
@@ -9536,7 +9536,7 @@
           <a:p>
             <a:pPr>
               <a:buFont typeface="+mj-lt"/>
-              <a:buAutoNum type="arabicPeriod"/>
+              <a:buAutoNum type="arabicParenR"/>
             </a:pPr>
             <a:r>
               <a:rPr lang="en-US" dirty="0"/>

</xml_diff>